<commit_message>
Add spine model canvas v0.1 and 0.2
</commit_message>
<xml_diff>
--- a/_drafts/canvas/spine-canvas-template.pptx
+++ b/_drafts/canvas/spine-canvas-template.pptx
@@ -5,10 +5,11 @@
     <p:sldMasterId id="2147483660" r:id="rId1"/>
   </p:sldMasterIdLst>
   <p:notesMasterIdLst>
-    <p:notesMasterId r:id="rId3"/>
+    <p:notesMasterId r:id="rId4"/>
   </p:notesMasterIdLst>
   <p:sldIdLst>
     <p:sldId id="256" r:id="rId2"/>
+    <p:sldId id="257" r:id="rId3"/>
   </p:sldIdLst>
   <p:sldSz cx="12801600" cy="9601200" type="A3"/>
   <p:notesSz cx="6858000" cy="9144000"/>
@@ -197,7 +198,7 @@
           <a:p>
             <a:fld id="{76EA345D-03BA-9648-9376-BEC8D0EB82D8}" type="datetimeFigureOut">
               <a:rPr lang="en-US" smtClean="0"/>
-              <a:t>10/17/16</a:t>
+              <a:t>11/2/16</a:t>
             </a:fld>
             <a:endParaRPr lang="en-US"/>
           </a:p>
@@ -549,6 +550,90 @@
 </p:notes>
 </file>
 
+<file path=ppt/notesSlides/notesSlide2.xml><?xml version="1.0" encoding="utf-8"?>
+<p:notes xmlns:a="http://schemas.openxmlformats.org/drawingml/2006/main" xmlns:r="http://schemas.openxmlformats.org/officeDocument/2006/relationships" xmlns:p="http://schemas.openxmlformats.org/presentationml/2006/main">
+  <p:cSld>
+    <p:spTree>
+      <p:nvGrpSpPr>
+        <p:cNvPr id="1" name=""/>
+        <p:cNvGrpSpPr/>
+        <p:nvPr/>
+      </p:nvGrpSpPr>
+      <p:grpSpPr>
+        <a:xfrm>
+          <a:off x="0" y="0"/>
+          <a:ext cx="0" cy="0"/>
+          <a:chOff x="0" y="0"/>
+          <a:chExt cx="0" cy="0"/>
+        </a:xfrm>
+      </p:grpSpPr>
+      <p:sp>
+        <p:nvSpPr>
+          <p:cNvPr id="2" name="Slide Image Placeholder 1"/>
+          <p:cNvSpPr>
+            <a:spLocks noGrp="1" noRot="1" noChangeAspect="1"/>
+          </p:cNvSpPr>
+          <p:nvPr>
+            <p:ph type="sldImg"/>
+          </p:nvPr>
+        </p:nvSpPr>
+        <p:spPr/>
+      </p:sp>
+      <p:sp>
+        <p:nvSpPr>
+          <p:cNvPr id="3" name="Notes Placeholder 2"/>
+          <p:cNvSpPr>
+            <a:spLocks noGrp="1"/>
+          </p:cNvSpPr>
+          <p:nvPr>
+            <p:ph type="body" idx="1"/>
+          </p:nvPr>
+        </p:nvSpPr>
+        <p:spPr/>
+        <p:txBody>
+          <a:bodyPr/>
+          <a:lstStyle/>
+          <a:p>
+            <a:endParaRPr lang="en-US" dirty="0"/>
+          </a:p>
+        </p:txBody>
+      </p:sp>
+      <p:sp>
+        <p:nvSpPr>
+          <p:cNvPr id="4" name="Slide Number Placeholder 3"/>
+          <p:cNvSpPr>
+            <a:spLocks noGrp="1"/>
+          </p:cNvSpPr>
+          <p:nvPr>
+            <p:ph type="sldNum" sz="quarter" idx="10"/>
+          </p:nvPr>
+        </p:nvSpPr>
+        <p:spPr/>
+        <p:txBody>
+          <a:bodyPr/>
+          <a:lstStyle/>
+          <a:p>
+            <a:fld id="{78D1C0AA-C797-DD44-881A-F85DF2E12CB1}" type="slidenum">
+              <a:rPr lang="en-US" smtClean="0"/>
+              <a:t>2</a:t>
+            </a:fld>
+            <a:endParaRPr lang="en-US"/>
+          </a:p>
+        </p:txBody>
+      </p:sp>
+    </p:spTree>
+    <p:extLst>
+      <p:ext uri="{BB962C8B-B14F-4D97-AF65-F5344CB8AC3E}">
+        <p14:creationId xmlns:p14="http://schemas.microsoft.com/office/powerpoint/2010/main" val="1957747793"/>
+      </p:ext>
+    </p:extLst>
+  </p:cSld>
+  <p:clrMapOvr>
+    <a:masterClrMapping/>
+  </p:clrMapOvr>
+</p:notes>
+</file>
+
 <file path=ppt/slideLayouts/slideLayout1.xml><?xml version="1.0" encoding="utf-8"?>
 <p:sldLayout xmlns:a="http://schemas.openxmlformats.org/drawingml/2006/main" xmlns:r="http://schemas.openxmlformats.org/officeDocument/2006/relationships" xmlns:p="http://schemas.openxmlformats.org/presentationml/2006/main" type="title" preserve="1">
   <p:cSld name="Title Slide">
@@ -680,7 +765,7 @@
           <a:p>
             <a:fld id="{1AFF1306-B60B-7F43-BCCF-F7E7344AAF99}" type="datetimeFigureOut">
               <a:rPr lang="en-US" smtClean="0"/>
-              <a:t>10/17/16</a:t>
+              <a:t>11/2/16</a:t>
             </a:fld>
             <a:endParaRPr lang="en-US"/>
           </a:p>
@@ -850,7 +935,7 @@
           <a:p>
             <a:fld id="{1AFF1306-B60B-7F43-BCCF-F7E7344AAF99}" type="datetimeFigureOut">
               <a:rPr lang="en-US" smtClean="0"/>
-              <a:t>10/17/16</a:t>
+              <a:t>11/2/16</a:t>
             </a:fld>
             <a:endParaRPr lang="en-US"/>
           </a:p>
@@ -1030,7 +1115,7 @@
           <a:p>
             <a:fld id="{1AFF1306-B60B-7F43-BCCF-F7E7344AAF99}" type="datetimeFigureOut">
               <a:rPr lang="en-US" smtClean="0"/>
-              <a:t>10/17/16</a:t>
+              <a:t>11/2/16</a:t>
             </a:fld>
             <a:endParaRPr lang="en-US"/>
           </a:p>
@@ -1200,7 +1285,7 @@
           <a:p>
             <a:fld id="{1AFF1306-B60B-7F43-BCCF-F7E7344AAF99}" type="datetimeFigureOut">
               <a:rPr lang="en-US" smtClean="0"/>
-              <a:t>10/17/16</a:t>
+              <a:t>11/2/16</a:t>
             </a:fld>
             <a:endParaRPr lang="en-US"/>
           </a:p>
@@ -1444,7 +1529,7 @@
           <a:p>
             <a:fld id="{1AFF1306-B60B-7F43-BCCF-F7E7344AAF99}" type="datetimeFigureOut">
               <a:rPr lang="en-US" smtClean="0"/>
-              <a:t>10/17/16</a:t>
+              <a:t>11/2/16</a:t>
             </a:fld>
             <a:endParaRPr lang="en-US"/>
           </a:p>
@@ -1676,7 +1761,7 @@
           <a:p>
             <a:fld id="{1AFF1306-B60B-7F43-BCCF-F7E7344AAF99}" type="datetimeFigureOut">
               <a:rPr lang="en-US" smtClean="0"/>
-              <a:t>10/17/16</a:t>
+              <a:t>11/2/16</a:t>
             </a:fld>
             <a:endParaRPr lang="en-US"/>
           </a:p>
@@ -2043,7 +2128,7 @@
           <a:p>
             <a:fld id="{1AFF1306-B60B-7F43-BCCF-F7E7344AAF99}" type="datetimeFigureOut">
               <a:rPr lang="en-US" smtClean="0"/>
-              <a:t>10/17/16</a:t>
+              <a:t>11/2/16</a:t>
             </a:fld>
             <a:endParaRPr lang="en-US"/>
           </a:p>
@@ -2161,7 +2246,7 @@
           <a:p>
             <a:fld id="{1AFF1306-B60B-7F43-BCCF-F7E7344AAF99}" type="datetimeFigureOut">
               <a:rPr lang="en-US" smtClean="0"/>
-              <a:t>10/17/16</a:t>
+              <a:t>11/2/16</a:t>
             </a:fld>
             <a:endParaRPr lang="en-US"/>
           </a:p>
@@ -2256,7 +2341,7 @@
           <a:p>
             <a:fld id="{1AFF1306-B60B-7F43-BCCF-F7E7344AAF99}" type="datetimeFigureOut">
               <a:rPr lang="en-US" smtClean="0"/>
-              <a:t>10/17/16</a:t>
+              <a:t>11/2/16</a:t>
             </a:fld>
             <a:endParaRPr lang="en-US"/>
           </a:p>
@@ -2533,7 +2618,7 @@
           <a:p>
             <a:fld id="{1AFF1306-B60B-7F43-BCCF-F7E7344AAF99}" type="datetimeFigureOut">
               <a:rPr lang="en-US" smtClean="0"/>
-              <a:t>10/17/16</a:t>
+              <a:t>11/2/16</a:t>
             </a:fld>
             <a:endParaRPr lang="en-US"/>
           </a:p>
@@ -2790,7 +2875,7 @@
           <a:p>
             <a:fld id="{1AFF1306-B60B-7F43-BCCF-F7E7344AAF99}" type="datetimeFigureOut">
               <a:rPr lang="en-US" smtClean="0"/>
-              <a:t>10/17/16</a:t>
+              <a:t>11/2/16</a:t>
             </a:fld>
             <a:endParaRPr lang="en-US"/>
           </a:p>
@@ -3003,7 +3088,7 @@
           <a:p>
             <a:fld id="{1AFF1306-B60B-7F43-BCCF-F7E7344AAF99}" type="datetimeFigureOut">
               <a:rPr lang="en-US" smtClean="0"/>
-              <a:t>10/17/16</a:t>
+              <a:t>11/2/16</a:t>
             </a:fld>
             <a:endParaRPr lang="en-US"/>
           </a:p>
@@ -5969,6 +6054,3063 @@
   <p:clrMapOvr>
     <a:masterClrMapping/>
   </p:clrMapOvr>
+  <p:timing>
+    <p:tnLst>
+      <p:par>
+        <p:cTn id="1" dur="indefinite" restart="never" nodeType="tmRoot"/>
+      </p:par>
+    </p:tnLst>
+  </p:timing>
+</p:sld>
+</file>
+
+<file path=ppt/slides/slide2.xml><?xml version="1.0" encoding="utf-8"?>
+<p:sld xmlns:a="http://schemas.openxmlformats.org/drawingml/2006/main" xmlns:r="http://schemas.openxmlformats.org/officeDocument/2006/relationships" xmlns:p="http://schemas.openxmlformats.org/presentationml/2006/main">
+  <p:cSld>
+    <p:spTree>
+      <p:nvGrpSpPr>
+        <p:cNvPr id="1" name=""/>
+        <p:cNvGrpSpPr/>
+        <p:nvPr/>
+      </p:nvGrpSpPr>
+      <p:grpSpPr>
+        <a:xfrm>
+          <a:off x="0" y="0"/>
+          <a:ext cx="0" cy="0"/>
+          <a:chOff x="0" y="0"/>
+          <a:chExt cx="0" cy="0"/>
+        </a:xfrm>
+      </p:grpSpPr>
+      <p:cxnSp>
+        <p:nvCxnSpPr>
+          <p:cNvPr id="79" name="Straight Connector 78"/>
+          <p:cNvCxnSpPr>
+            <a:cxnSpLocks/>
+          </p:cNvCxnSpPr>
+          <p:nvPr/>
+        </p:nvCxnSpPr>
+        <p:spPr>
+          <a:xfrm flipV="1">
+            <a:off x="2992301" y="8396041"/>
+            <a:ext cx="9817200" cy="12031"/>
+          </a:xfrm>
+          <a:prstGeom prst="line">
+            <a:avLst/>
+          </a:prstGeom>
+          <a:ln>
+            <a:solidFill>
+              <a:schemeClr val="bg2"/>
+            </a:solidFill>
+          </a:ln>
+        </p:spPr>
+        <p:style>
+          <a:lnRef idx="1">
+            <a:schemeClr val="accent1"/>
+          </a:lnRef>
+          <a:fillRef idx="0">
+            <a:schemeClr val="accent1"/>
+          </a:fillRef>
+          <a:effectRef idx="0">
+            <a:schemeClr val="accent1"/>
+          </a:effectRef>
+          <a:fontRef idx="minor">
+            <a:schemeClr val="tx1"/>
+          </a:fontRef>
+        </p:style>
+      </p:cxnSp>
+      <p:cxnSp>
+        <p:nvCxnSpPr>
+          <p:cNvPr id="80" name="Straight Connector 79"/>
+          <p:cNvCxnSpPr>
+            <a:cxnSpLocks/>
+          </p:cNvCxnSpPr>
+          <p:nvPr/>
+        </p:nvCxnSpPr>
+        <p:spPr>
+          <a:xfrm flipV="1">
+            <a:off x="2989393" y="8637174"/>
+            <a:ext cx="9817200" cy="12031"/>
+          </a:xfrm>
+          <a:prstGeom prst="line">
+            <a:avLst/>
+          </a:prstGeom>
+          <a:ln>
+            <a:solidFill>
+              <a:schemeClr val="bg2"/>
+            </a:solidFill>
+          </a:ln>
+        </p:spPr>
+        <p:style>
+          <a:lnRef idx="1">
+            <a:schemeClr val="accent1"/>
+          </a:lnRef>
+          <a:fillRef idx="0">
+            <a:schemeClr val="accent1"/>
+          </a:fillRef>
+          <a:effectRef idx="0">
+            <a:schemeClr val="accent1"/>
+          </a:effectRef>
+          <a:fontRef idx="minor">
+            <a:schemeClr val="tx1"/>
+          </a:fontRef>
+        </p:style>
+      </p:cxnSp>
+      <p:cxnSp>
+        <p:nvCxnSpPr>
+          <p:cNvPr id="81" name="Straight Connector 80"/>
+          <p:cNvCxnSpPr>
+            <a:cxnSpLocks/>
+          </p:cNvCxnSpPr>
+          <p:nvPr/>
+        </p:nvCxnSpPr>
+        <p:spPr>
+          <a:xfrm flipV="1">
+            <a:off x="2992301" y="8878303"/>
+            <a:ext cx="9817200" cy="12031"/>
+          </a:xfrm>
+          <a:prstGeom prst="line">
+            <a:avLst/>
+          </a:prstGeom>
+          <a:ln>
+            <a:solidFill>
+              <a:schemeClr val="bg2"/>
+            </a:solidFill>
+          </a:ln>
+        </p:spPr>
+        <p:style>
+          <a:lnRef idx="1">
+            <a:schemeClr val="accent1"/>
+          </a:lnRef>
+          <a:fillRef idx="0">
+            <a:schemeClr val="accent1"/>
+          </a:fillRef>
+          <a:effectRef idx="0">
+            <a:schemeClr val="accent1"/>
+          </a:effectRef>
+          <a:fontRef idx="minor">
+            <a:schemeClr val="tx1"/>
+          </a:fontRef>
+        </p:style>
+      </p:cxnSp>
+      <p:cxnSp>
+        <p:nvCxnSpPr>
+          <p:cNvPr id="86" name="Straight Connector 85"/>
+          <p:cNvCxnSpPr>
+            <a:cxnSpLocks/>
+          </p:cNvCxnSpPr>
+          <p:nvPr/>
+        </p:nvCxnSpPr>
+        <p:spPr>
+          <a:xfrm flipV="1">
+            <a:off x="3003644" y="9118945"/>
+            <a:ext cx="9817200" cy="12031"/>
+          </a:xfrm>
+          <a:prstGeom prst="line">
+            <a:avLst/>
+          </a:prstGeom>
+          <a:ln>
+            <a:solidFill>
+              <a:schemeClr val="bg2"/>
+            </a:solidFill>
+          </a:ln>
+        </p:spPr>
+        <p:style>
+          <a:lnRef idx="1">
+            <a:schemeClr val="accent1"/>
+          </a:lnRef>
+          <a:fillRef idx="0">
+            <a:schemeClr val="accent1"/>
+          </a:fillRef>
+          <a:effectRef idx="0">
+            <a:schemeClr val="accent1"/>
+          </a:effectRef>
+          <a:fontRef idx="minor">
+            <a:schemeClr val="tx1"/>
+          </a:fontRef>
+        </p:style>
+      </p:cxnSp>
+      <p:cxnSp>
+        <p:nvCxnSpPr>
+          <p:cNvPr id="87" name="Straight Connector 86"/>
+          <p:cNvCxnSpPr>
+            <a:cxnSpLocks/>
+          </p:cNvCxnSpPr>
+          <p:nvPr/>
+        </p:nvCxnSpPr>
+        <p:spPr>
+          <a:xfrm flipV="1">
+            <a:off x="3006552" y="9360078"/>
+            <a:ext cx="9817200" cy="12031"/>
+          </a:xfrm>
+          <a:prstGeom prst="line">
+            <a:avLst/>
+          </a:prstGeom>
+          <a:ln>
+            <a:solidFill>
+              <a:schemeClr val="bg2"/>
+            </a:solidFill>
+          </a:ln>
+        </p:spPr>
+        <p:style>
+          <a:lnRef idx="1">
+            <a:schemeClr val="accent1"/>
+          </a:lnRef>
+          <a:fillRef idx="0">
+            <a:schemeClr val="accent1"/>
+          </a:fillRef>
+          <a:effectRef idx="0">
+            <a:schemeClr val="accent1"/>
+          </a:effectRef>
+          <a:fontRef idx="minor">
+            <a:schemeClr val="tx1"/>
+          </a:fontRef>
+        </p:style>
+      </p:cxnSp>
+      <p:sp>
+        <p:nvSpPr>
+          <p:cNvPr id="48" name="Rectangle 47"/>
+          <p:cNvSpPr/>
+          <p:nvPr/>
+        </p:nvSpPr>
+        <p:spPr>
+          <a:xfrm>
+            <a:off x="8394700" y="8174440"/>
+            <a:ext cx="4405653" cy="1414283"/>
+          </a:xfrm>
+          <a:prstGeom prst="rect">
+            <a:avLst/>
+          </a:prstGeom>
+          <a:solidFill>
+            <a:schemeClr val="bg1"/>
+          </a:solidFill>
+          <a:ln>
+            <a:solidFill>
+              <a:schemeClr val="bg1">
+                <a:lumMod val="50000"/>
+              </a:schemeClr>
+            </a:solidFill>
+          </a:ln>
+        </p:spPr>
+        <p:style>
+          <a:lnRef idx="2">
+            <a:schemeClr val="accent1">
+              <a:shade val="50000"/>
+            </a:schemeClr>
+          </a:lnRef>
+          <a:fillRef idx="1">
+            <a:schemeClr val="accent1"/>
+          </a:fillRef>
+          <a:effectRef idx="0">
+            <a:schemeClr val="accent1"/>
+          </a:effectRef>
+          <a:fontRef idx="minor">
+            <a:schemeClr val="lt1"/>
+          </a:fontRef>
+        </p:style>
+        <p:txBody>
+          <a:bodyPr rot="0" spcFirstLastPara="0" vertOverflow="overflow" horzOverflow="overflow" vert="horz" wrap="square" lIns="91440" tIns="45720" rIns="91440" bIns="45720" numCol="1" spcCol="0" rtlCol="0" fromWordArt="0" anchor="t" anchorCtr="0" forceAA="0" compatLnSpc="1">
+            <a:prstTxWarp prst="textNoShape">
+              <a:avLst/>
+            </a:prstTxWarp>
+            <a:noAutofit/>
+          </a:bodyPr>
+          <a:lstStyle/>
+          <a:p>
+            <a:r>
+              <a:rPr lang="en-US" sz="1100" dirty="0" smtClean="0">
+                <a:solidFill>
+                  <a:schemeClr val="bg1">
+                    <a:lumMod val="50000"/>
+                  </a:schemeClr>
+                </a:solidFill>
+                <a:latin typeface="Century Gothic" charset="0"/>
+                <a:ea typeface="Century Gothic" charset="0"/>
+                <a:cs typeface="Century Gothic" charset="0"/>
+              </a:rPr>
+              <a:t>Steps:</a:t>
+            </a:r>
+          </a:p>
+          <a:p>
+            <a:pPr marL="228600" indent="-228600">
+              <a:buFont typeface="+mj-lt"/>
+              <a:buAutoNum type="arabicPeriod"/>
+            </a:pPr>
+            <a:r>
+              <a:rPr lang="en-US" sz="1100" dirty="0" smtClean="0">
+                <a:solidFill>
+                  <a:schemeClr val="bg1">
+                    <a:lumMod val="50000"/>
+                  </a:schemeClr>
+                </a:solidFill>
+                <a:latin typeface="Century Gothic" charset="0"/>
+                <a:ea typeface="Century Gothic" charset="0"/>
+                <a:cs typeface="Century Gothic" charset="0"/>
+              </a:rPr>
+              <a:t>Define the boundaries of the system you would like to map</a:t>
+            </a:r>
+          </a:p>
+          <a:p>
+            <a:pPr marL="228600" indent="-228600">
+              <a:buFont typeface="+mj-lt"/>
+              <a:buAutoNum type="arabicPeriod"/>
+            </a:pPr>
+            <a:r>
+              <a:rPr lang="en-US" sz="1100" dirty="0" smtClean="0">
+                <a:solidFill>
+                  <a:schemeClr val="bg1">
+                    <a:lumMod val="50000"/>
+                  </a:schemeClr>
+                </a:solidFill>
+                <a:latin typeface="Century Gothic" charset="0"/>
+                <a:ea typeface="Century Gothic" charset="0"/>
+                <a:cs typeface="Century Gothic" charset="0"/>
+              </a:rPr>
+              <a:t>Agree on a time scale</a:t>
+            </a:r>
+          </a:p>
+          <a:p>
+            <a:pPr marL="228600" indent="-228600">
+              <a:buFont typeface="+mj-lt"/>
+              <a:buAutoNum type="arabicPeriod"/>
+            </a:pPr>
+            <a:r>
+              <a:rPr lang="en-US" sz="1100" dirty="0" smtClean="0">
+                <a:solidFill>
+                  <a:schemeClr val="bg1">
+                    <a:lumMod val="50000"/>
+                  </a:schemeClr>
+                </a:solidFill>
+                <a:latin typeface="Century Gothic" charset="0"/>
+                <a:ea typeface="Century Gothic" charset="0"/>
+                <a:cs typeface="Century Gothic" charset="0"/>
+              </a:rPr>
+              <a:t>Agree on the Needs the system exists for, from multiple perspectives (mark each with </a:t>
+            </a:r>
+            <a:r>
+              <a:rPr lang="en-US" sz="1100" dirty="0" smtClean="0">
+                <a:solidFill>
+                  <a:schemeClr val="bg1">
+                    <a:lumMod val="50000"/>
+                  </a:schemeClr>
+                </a:solidFill>
+                <a:latin typeface="Courier New" charset="0"/>
+                <a:ea typeface="Courier New" charset="0"/>
+                <a:cs typeface="Courier New" charset="0"/>
+              </a:rPr>
+              <a:t>[I]</a:t>
+            </a:r>
+            <a:r>
+              <a:rPr lang="en-US" sz="1100" dirty="0" smtClean="0">
+                <a:solidFill>
+                  <a:schemeClr val="bg1">
+                    <a:lumMod val="50000"/>
+                  </a:schemeClr>
+                </a:solidFill>
+                <a:latin typeface="Century Gothic" charset="0"/>
+                <a:ea typeface="Century Gothic" charset="0"/>
+                <a:cs typeface="Century Gothic" charset="0"/>
+              </a:rPr>
+              <a:t>, </a:t>
+            </a:r>
+            <a:r>
+              <a:rPr lang="en-US" sz="1100" dirty="0" smtClean="0">
+                <a:solidFill>
+                  <a:schemeClr val="bg1">
+                    <a:lumMod val="50000"/>
+                  </a:schemeClr>
+                </a:solidFill>
+                <a:latin typeface="Courier New" charset="0"/>
+                <a:ea typeface="Courier New" charset="0"/>
+                <a:cs typeface="Courier New" charset="0"/>
+              </a:rPr>
+              <a:t>[O]</a:t>
+            </a:r>
+            <a:r>
+              <a:rPr lang="en-US" sz="1100" dirty="0" smtClean="0">
+                <a:solidFill>
+                  <a:schemeClr val="bg1">
+                    <a:lumMod val="50000"/>
+                  </a:schemeClr>
+                </a:solidFill>
+                <a:latin typeface="Century Gothic" charset="0"/>
+                <a:ea typeface="Century Gothic" charset="0"/>
+                <a:cs typeface="Century Gothic" charset="0"/>
+              </a:rPr>
+              <a:t> or </a:t>
+            </a:r>
+            <a:r>
+              <a:rPr lang="en-US" sz="1100" dirty="0" smtClean="0">
+                <a:solidFill>
+                  <a:schemeClr val="bg1">
+                    <a:lumMod val="50000"/>
+                  </a:schemeClr>
+                </a:solidFill>
+                <a:latin typeface="Courier New" charset="0"/>
+                <a:ea typeface="Courier New" charset="0"/>
+                <a:cs typeface="Courier New" charset="0"/>
+              </a:rPr>
+              <a:t>[P])</a:t>
+            </a:r>
+          </a:p>
+          <a:p>
+            <a:pPr marL="228600" indent="-228600">
+              <a:buFont typeface="+mj-lt"/>
+              <a:buAutoNum type="arabicPeriod"/>
+            </a:pPr>
+            <a:r>
+              <a:rPr lang="en-US" sz="1100" dirty="0" smtClean="0">
+                <a:solidFill>
+                  <a:schemeClr val="bg1">
+                    <a:lumMod val="50000"/>
+                  </a:schemeClr>
+                </a:solidFill>
+                <a:latin typeface="Century Gothic" charset="0"/>
+                <a:ea typeface="Century Gothic" charset="0"/>
+                <a:cs typeface="Century Gothic" charset="0"/>
+              </a:rPr>
+              <a:t>Walk up and down the spine adding items, always making sure they connect up to one or more Needs.</a:t>
+            </a:r>
+          </a:p>
+          <a:p>
+            <a:pPr marL="228600" indent="-228600">
+              <a:buFont typeface="+mj-lt"/>
+              <a:buAutoNum type="arabicPeriod"/>
+            </a:pPr>
+            <a:endParaRPr lang="en-US" sz="800" dirty="0" smtClean="0">
+              <a:solidFill>
+                <a:schemeClr val="bg1">
+                  <a:lumMod val="50000"/>
+                </a:schemeClr>
+              </a:solidFill>
+              <a:latin typeface="Century Gothic" charset="0"/>
+              <a:ea typeface="Century Gothic" charset="0"/>
+              <a:cs typeface="Century Gothic" charset="0"/>
+            </a:endParaRPr>
+          </a:p>
+        </p:txBody>
+      </p:sp>
+      <p:sp>
+        <p:nvSpPr>
+          <p:cNvPr id="5" name="Rectangle 4"/>
+          <p:cNvSpPr/>
+          <p:nvPr/>
+        </p:nvSpPr>
+        <p:spPr>
+          <a:xfrm>
+            <a:off x="2500" y="2500"/>
+            <a:ext cx="2980543" cy="9601200"/>
+          </a:xfrm>
+          <a:prstGeom prst="rect">
+            <a:avLst/>
+          </a:prstGeom>
+          <a:noFill/>
+          <a:ln>
+            <a:solidFill>
+              <a:schemeClr val="tx1"/>
+            </a:solidFill>
+          </a:ln>
+        </p:spPr>
+        <p:style>
+          <a:lnRef idx="2">
+            <a:schemeClr val="accent1">
+              <a:shade val="50000"/>
+            </a:schemeClr>
+          </a:lnRef>
+          <a:fillRef idx="1">
+            <a:schemeClr val="accent1"/>
+          </a:fillRef>
+          <a:effectRef idx="0">
+            <a:schemeClr val="accent1"/>
+          </a:effectRef>
+          <a:fontRef idx="minor">
+            <a:schemeClr val="lt1"/>
+          </a:fontRef>
+        </p:style>
+        <p:txBody>
+          <a:bodyPr rtlCol="0" anchor="ctr"/>
+          <a:lstStyle/>
+          <a:p>
+            <a:pPr algn="ctr"/>
+            <a:endParaRPr lang="en-US"/>
+          </a:p>
+        </p:txBody>
+      </p:sp>
+      <p:sp>
+        <p:nvSpPr>
+          <p:cNvPr id="6" name="Rectangle 5"/>
+          <p:cNvSpPr/>
+          <p:nvPr/>
+        </p:nvSpPr>
+        <p:spPr>
+          <a:xfrm>
+            <a:off x="5000" y="5000"/>
+            <a:ext cx="2980543" cy="1149243"/>
+          </a:xfrm>
+          <a:prstGeom prst="rect">
+            <a:avLst/>
+          </a:prstGeom>
+          <a:solidFill>
+            <a:schemeClr val="bg1">
+              <a:lumMod val="75000"/>
+            </a:schemeClr>
+          </a:solidFill>
+          <a:ln>
+            <a:solidFill>
+              <a:schemeClr val="tx1"/>
+            </a:solidFill>
+          </a:ln>
+        </p:spPr>
+        <p:style>
+          <a:lnRef idx="2">
+            <a:schemeClr val="accent1">
+              <a:shade val="50000"/>
+            </a:schemeClr>
+          </a:lnRef>
+          <a:fillRef idx="1">
+            <a:schemeClr val="accent1"/>
+          </a:fillRef>
+          <a:effectRef idx="0">
+            <a:schemeClr val="accent1"/>
+          </a:effectRef>
+          <a:fontRef idx="minor">
+            <a:schemeClr val="lt1"/>
+          </a:fontRef>
+        </p:style>
+        <p:txBody>
+          <a:bodyPr rtlCol="0" anchor="ctr"/>
+          <a:lstStyle/>
+          <a:p>
+            <a:pPr algn="ctr"/>
+            <a:r>
+              <a:rPr lang="en-US" dirty="0" smtClean="0">
+                <a:solidFill>
+                  <a:schemeClr val="tx1"/>
+                </a:solidFill>
+                <a:latin typeface="Century Gothic" charset="0"/>
+                <a:ea typeface="Century Gothic" charset="0"/>
+                <a:cs typeface="Century Gothic" charset="0"/>
+              </a:rPr>
+              <a:t>Spine Model</a:t>
+            </a:r>
+          </a:p>
+          <a:p>
+            <a:pPr algn="ctr"/>
+            <a:r>
+              <a:rPr lang="en-US" dirty="0" smtClean="0">
+                <a:solidFill>
+                  <a:schemeClr val="tx1"/>
+                </a:solidFill>
+                <a:latin typeface="Century Gothic" charset="0"/>
+                <a:ea typeface="Century Gothic" charset="0"/>
+                <a:cs typeface="Century Gothic" charset="0"/>
+              </a:rPr>
+              <a:t>C A N V A S</a:t>
+            </a:r>
+          </a:p>
+          <a:p>
+            <a:pPr algn="ctr"/>
+            <a:r>
+              <a:rPr lang="en-US" sz="1100" dirty="0" smtClean="0">
+                <a:solidFill>
+                  <a:schemeClr val="tx1"/>
+                </a:solidFill>
+                <a:latin typeface="Century Gothic" charset="0"/>
+                <a:ea typeface="Century Gothic" charset="0"/>
+                <a:cs typeface="Century Gothic" charset="0"/>
+                <a:hlinkClick r:id="rId3"/>
+              </a:rPr>
+              <a:t>www.spinemodel.info</a:t>
+            </a:r>
+            <a:endParaRPr lang="en-US" sz="1100" dirty="0" smtClean="0">
+              <a:solidFill>
+                <a:schemeClr val="tx1"/>
+              </a:solidFill>
+              <a:latin typeface="Century Gothic" charset="0"/>
+              <a:ea typeface="Century Gothic" charset="0"/>
+              <a:cs typeface="Century Gothic" charset="0"/>
+            </a:endParaRPr>
+          </a:p>
+        </p:txBody>
+      </p:sp>
+      <p:sp>
+        <p:nvSpPr>
+          <p:cNvPr id="8" name="Rectangle 7"/>
+          <p:cNvSpPr/>
+          <p:nvPr/>
+        </p:nvSpPr>
+        <p:spPr>
+          <a:xfrm>
+            <a:off x="5000" y="9118945"/>
+            <a:ext cx="2980543" cy="480992"/>
+          </a:xfrm>
+          <a:prstGeom prst="rect">
+            <a:avLst/>
+          </a:prstGeom>
+          <a:solidFill>
+            <a:schemeClr val="bg1">
+              <a:lumMod val="95000"/>
+            </a:schemeClr>
+          </a:solidFill>
+          <a:ln>
+            <a:solidFill>
+              <a:schemeClr val="tx1"/>
+            </a:solidFill>
+          </a:ln>
+        </p:spPr>
+        <p:style>
+          <a:lnRef idx="2">
+            <a:schemeClr val="accent1">
+              <a:shade val="50000"/>
+            </a:schemeClr>
+          </a:lnRef>
+          <a:fillRef idx="1">
+            <a:schemeClr val="accent1"/>
+          </a:fillRef>
+          <a:effectRef idx="0">
+            <a:schemeClr val="accent1"/>
+          </a:effectRef>
+          <a:fontRef idx="minor">
+            <a:schemeClr val="lt1"/>
+          </a:fontRef>
+        </p:style>
+        <p:txBody>
+          <a:bodyPr rtlCol="0" anchor="ctr"/>
+          <a:lstStyle/>
+          <a:p>
+            <a:r>
+              <a:rPr lang="en-US" sz="800" dirty="0" smtClean="0">
+                <a:solidFill>
+                  <a:schemeClr val="tx1"/>
+                </a:solidFill>
+                <a:latin typeface="Century Gothic" charset="0"/>
+                <a:ea typeface="Century Gothic" charset="0"/>
+                <a:cs typeface="Century Gothic" charset="0"/>
+              </a:rPr>
+              <a:t>    </a:t>
+            </a:r>
+            <a:r>
+              <a:rPr lang="en-US" sz="800" dirty="0" smtClean="0">
+                <a:solidFill>
+                  <a:schemeClr val="tx1"/>
+                </a:solidFill>
+                <a:latin typeface="Century Gothic" charset="0"/>
+                <a:ea typeface="Century Gothic" charset="0"/>
+                <a:cs typeface="Century Gothic" charset="0"/>
+              </a:rPr>
+              <a:t>v0.2 (Nov </a:t>
+            </a:r>
+            <a:r>
+              <a:rPr lang="en-US" sz="800" dirty="0" smtClean="0">
+                <a:solidFill>
+                  <a:schemeClr val="tx1"/>
+                </a:solidFill>
+                <a:latin typeface="Century Gothic" charset="0"/>
+                <a:ea typeface="Century Gothic" charset="0"/>
+                <a:cs typeface="Century Gothic" charset="0"/>
+              </a:rPr>
+              <a:t>2016)</a:t>
+            </a:r>
+            <a:endParaRPr lang="en-US" sz="800" dirty="0">
+              <a:solidFill>
+                <a:schemeClr val="tx1"/>
+              </a:solidFill>
+              <a:latin typeface="Century Gothic" charset="0"/>
+              <a:ea typeface="Century Gothic" charset="0"/>
+              <a:cs typeface="Century Gothic" charset="0"/>
+            </a:endParaRPr>
+          </a:p>
+        </p:txBody>
+      </p:sp>
+      <p:sp>
+        <p:nvSpPr>
+          <p:cNvPr id="11" name="Rectangle 10"/>
+          <p:cNvSpPr/>
+          <p:nvPr/>
+        </p:nvSpPr>
+        <p:spPr>
+          <a:xfrm>
+            <a:off x="5000" y="1154243"/>
+            <a:ext cx="2980543" cy="7962202"/>
+          </a:xfrm>
+          <a:prstGeom prst="rect">
+            <a:avLst/>
+          </a:prstGeom>
+          <a:noFill/>
+          <a:ln>
+            <a:solidFill>
+              <a:schemeClr val="tx1"/>
+            </a:solidFill>
+          </a:ln>
+        </p:spPr>
+        <p:style>
+          <a:lnRef idx="2">
+            <a:schemeClr val="accent1">
+              <a:shade val="50000"/>
+            </a:schemeClr>
+          </a:lnRef>
+          <a:fillRef idx="1">
+            <a:schemeClr val="accent1"/>
+          </a:fillRef>
+          <a:effectRef idx="0">
+            <a:schemeClr val="accent1"/>
+          </a:effectRef>
+          <a:fontRef idx="minor">
+            <a:schemeClr val="lt1"/>
+          </a:fontRef>
+        </p:style>
+        <p:txBody>
+          <a:bodyPr rtlCol="0" anchor="ctr"/>
+          <a:lstStyle/>
+          <a:p>
+            <a:pPr algn="ctr"/>
+            <a:r>
+              <a:rPr lang="en-US" sz="2800" b="1" dirty="0" smtClean="0">
+                <a:solidFill>
+                  <a:schemeClr val="tx1"/>
+                </a:solidFill>
+                <a:latin typeface="Century Gothic" charset="0"/>
+                <a:ea typeface="Century Gothic" charset="0"/>
+                <a:cs typeface="Century Gothic" charset="0"/>
+              </a:rPr>
+              <a:t>Needs</a:t>
+            </a:r>
+            <a:endParaRPr lang="en-US" sz="1200" dirty="0" smtClean="0">
+              <a:solidFill>
+                <a:schemeClr val="tx1"/>
+              </a:solidFill>
+              <a:latin typeface="Century Gothic" charset="0"/>
+              <a:ea typeface="Century Gothic" charset="0"/>
+              <a:cs typeface="Century Gothic" charset="0"/>
+            </a:endParaRPr>
+          </a:p>
+          <a:p>
+            <a:pPr algn="ctr"/>
+            <a:r>
+              <a:rPr lang="en-US" sz="1000" dirty="0" smtClean="0">
+                <a:solidFill>
+                  <a:schemeClr val="tx1"/>
+                </a:solidFill>
+                <a:latin typeface="Century Gothic" charset="0"/>
+                <a:ea typeface="Century Gothic" charset="0"/>
+                <a:cs typeface="Century Gothic" charset="0"/>
+              </a:rPr>
+              <a:t>Depends on the </a:t>
+            </a:r>
+            <a:r>
+              <a:rPr lang="en-US" sz="1000" i="1" dirty="0" smtClean="0">
+                <a:solidFill>
+                  <a:schemeClr val="tx1"/>
+                </a:solidFill>
+                <a:latin typeface="Century Gothic" charset="0"/>
+                <a:ea typeface="Century Gothic" charset="0"/>
+                <a:cs typeface="Century Gothic" charset="0"/>
+              </a:rPr>
+              <a:t>Perspective</a:t>
+            </a:r>
+            <a:r>
+              <a:rPr lang="en-US" sz="1000" dirty="0" smtClean="0">
+                <a:solidFill>
+                  <a:schemeClr val="tx1"/>
+                </a:solidFill>
+                <a:latin typeface="Century Gothic" charset="0"/>
+                <a:ea typeface="Century Gothic" charset="0"/>
+                <a:cs typeface="Century Gothic" charset="0"/>
+              </a:rPr>
+              <a:t> of the spine.</a:t>
+            </a:r>
+          </a:p>
+          <a:p>
+            <a:pPr algn="ctr"/>
+            <a:r>
+              <a:rPr lang="en-US" sz="1000" dirty="0">
+                <a:solidFill>
+                  <a:schemeClr val="tx1"/>
+                </a:solidFill>
+                <a:latin typeface="Century Gothic" charset="0"/>
+                <a:ea typeface="Century Gothic" charset="0"/>
+                <a:cs typeface="Century Gothic" charset="0"/>
+              </a:rPr>
+              <a:t/>
+            </a:r>
+            <a:br>
+              <a:rPr lang="en-US" sz="1000" dirty="0">
+                <a:solidFill>
+                  <a:schemeClr val="tx1"/>
+                </a:solidFill>
+                <a:latin typeface="Century Gothic" charset="0"/>
+                <a:ea typeface="Century Gothic" charset="0"/>
+                <a:cs typeface="Century Gothic" charset="0"/>
+              </a:rPr>
+            </a:br>
+            <a:r>
+              <a:rPr lang="en-US" sz="1000" dirty="0" smtClean="0">
+                <a:solidFill>
+                  <a:schemeClr val="tx1"/>
+                </a:solidFill>
+                <a:latin typeface="Century Gothic" charset="0"/>
+                <a:ea typeface="Century Gothic" charset="0"/>
+                <a:cs typeface="Century Gothic" charset="0"/>
+              </a:rPr>
+              <a:t>Answers the question: </a:t>
+            </a:r>
+            <a:r>
+              <a:rPr lang="en-US" sz="1000" i="1" dirty="0" smtClean="0">
+                <a:solidFill>
+                  <a:schemeClr val="tx1"/>
+                </a:solidFill>
+                <a:latin typeface="Century Gothic" charset="0"/>
+                <a:ea typeface="Century Gothic" charset="0"/>
+                <a:cs typeface="Century Gothic" charset="0"/>
+              </a:rPr>
+              <a:t>From this perspective, the system exists in order that _____.</a:t>
+            </a:r>
+          </a:p>
+          <a:p>
+            <a:pPr algn="ctr"/>
+            <a:endParaRPr lang="en-US" sz="1000" dirty="0" smtClean="0">
+              <a:solidFill>
+                <a:schemeClr val="tx1"/>
+              </a:solidFill>
+              <a:latin typeface="Century Gothic" charset="0"/>
+              <a:ea typeface="Century Gothic" charset="0"/>
+              <a:cs typeface="Century Gothic" charset="0"/>
+            </a:endParaRPr>
+          </a:p>
+          <a:p>
+            <a:pPr algn="ctr"/>
+            <a:r>
+              <a:rPr lang="en-US" sz="2800" b="1" dirty="0" smtClean="0">
+                <a:solidFill>
+                  <a:schemeClr val="tx1"/>
+                </a:solidFill>
+                <a:latin typeface="Century Gothic" charset="0"/>
+                <a:ea typeface="Century Gothic" charset="0"/>
+                <a:cs typeface="Century Gothic" charset="0"/>
+              </a:rPr>
+              <a:t>Values</a:t>
+            </a:r>
+          </a:p>
+          <a:p>
+            <a:pPr algn="ctr"/>
+            <a:r>
+              <a:rPr lang="en-US" sz="1000" dirty="0" smtClean="0">
+                <a:solidFill>
+                  <a:schemeClr val="tx1"/>
+                </a:solidFill>
+                <a:latin typeface="Century Gothic" charset="0"/>
+                <a:ea typeface="Century Gothic" charset="0"/>
+                <a:cs typeface="Century Gothic" charset="0"/>
+              </a:rPr>
+              <a:t>The qualities that, when </a:t>
+            </a:r>
+            <a:r>
+              <a:rPr lang="en-US" sz="1000" dirty="0" err="1" smtClean="0">
+                <a:solidFill>
+                  <a:schemeClr val="tx1"/>
+                </a:solidFill>
+                <a:latin typeface="Century Gothic" charset="0"/>
+                <a:ea typeface="Century Gothic" charset="0"/>
+                <a:cs typeface="Century Gothic" charset="0"/>
+              </a:rPr>
+              <a:t>optimised</a:t>
+            </a:r>
+            <a:r>
+              <a:rPr lang="en-US" sz="1000" dirty="0" smtClean="0">
+                <a:solidFill>
+                  <a:schemeClr val="tx1"/>
+                </a:solidFill>
+                <a:latin typeface="Century Gothic" charset="0"/>
+                <a:ea typeface="Century Gothic" charset="0"/>
+                <a:cs typeface="Century Gothic" charset="0"/>
+              </a:rPr>
+              <a:t> for, would create an environment in which the Needs are more likely to be met.</a:t>
+            </a:r>
+          </a:p>
+          <a:p>
+            <a:pPr algn="ctr"/>
+            <a:endParaRPr lang="en-US" sz="1000" dirty="0" smtClean="0">
+              <a:solidFill>
+                <a:schemeClr val="tx1"/>
+              </a:solidFill>
+              <a:latin typeface="Century Gothic" charset="0"/>
+              <a:ea typeface="Century Gothic" charset="0"/>
+              <a:cs typeface="Century Gothic" charset="0"/>
+            </a:endParaRPr>
+          </a:p>
+          <a:p>
+            <a:pPr algn="ctr"/>
+            <a:r>
+              <a:rPr lang="en-US" sz="1000" dirty="0" smtClean="0">
+                <a:solidFill>
+                  <a:schemeClr val="tx1"/>
+                </a:solidFill>
+                <a:latin typeface="Century Gothic" charset="0"/>
+                <a:ea typeface="Century Gothic" charset="0"/>
+                <a:cs typeface="Century Gothic" charset="0"/>
+              </a:rPr>
+              <a:t>Answers the question: </a:t>
+            </a:r>
+            <a:r>
+              <a:rPr lang="en-US" sz="1000" i="1" dirty="0" smtClean="0">
+                <a:solidFill>
+                  <a:schemeClr val="tx1"/>
+                </a:solidFill>
+                <a:latin typeface="Century Gothic" charset="0"/>
+                <a:ea typeface="Century Gothic" charset="0"/>
+                <a:cs typeface="Century Gothic" charset="0"/>
+              </a:rPr>
+              <a:t>We </a:t>
+            </a:r>
+            <a:r>
+              <a:rPr lang="en-US" sz="1000" i="1" dirty="0" err="1" smtClean="0">
+                <a:solidFill>
+                  <a:schemeClr val="tx1"/>
+                </a:solidFill>
+                <a:latin typeface="Century Gothic" charset="0"/>
+                <a:ea typeface="Century Gothic" charset="0"/>
+                <a:cs typeface="Century Gothic" charset="0"/>
+              </a:rPr>
+              <a:t>optimise</a:t>
+            </a:r>
+            <a:r>
+              <a:rPr lang="en-US" sz="1000" i="1" dirty="0" smtClean="0">
+                <a:solidFill>
+                  <a:schemeClr val="tx1"/>
+                </a:solidFill>
+                <a:latin typeface="Century Gothic" charset="0"/>
+                <a:ea typeface="Century Gothic" charset="0"/>
+                <a:cs typeface="Century Gothic" charset="0"/>
+              </a:rPr>
+              <a:t> the system for _____.</a:t>
+            </a:r>
+            <a:endParaRPr lang="en-US" sz="1000" i="1" dirty="0">
+              <a:solidFill>
+                <a:schemeClr val="tx1"/>
+              </a:solidFill>
+              <a:latin typeface="Century Gothic" charset="0"/>
+              <a:ea typeface="Century Gothic" charset="0"/>
+              <a:cs typeface="Century Gothic" charset="0"/>
+            </a:endParaRPr>
+          </a:p>
+          <a:p>
+            <a:pPr algn="ctr"/>
+            <a:endParaRPr lang="en-US" sz="1000" b="1" dirty="0" smtClean="0">
+              <a:solidFill>
+                <a:schemeClr val="tx1"/>
+              </a:solidFill>
+              <a:latin typeface="Century Gothic" charset="0"/>
+              <a:ea typeface="Century Gothic" charset="0"/>
+              <a:cs typeface="Century Gothic" charset="0"/>
+            </a:endParaRPr>
+          </a:p>
+          <a:p>
+            <a:pPr algn="ctr"/>
+            <a:r>
+              <a:rPr lang="en-US" sz="2800" b="1" dirty="0" smtClean="0">
+                <a:solidFill>
+                  <a:schemeClr val="tx1"/>
+                </a:solidFill>
+                <a:latin typeface="Century Gothic" charset="0"/>
+                <a:ea typeface="Century Gothic" charset="0"/>
+                <a:cs typeface="Century Gothic" charset="0"/>
+              </a:rPr>
+              <a:t>Principles</a:t>
+            </a:r>
+          </a:p>
+          <a:p>
+            <a:pPr algn="ctr"/>
+            <a:r>
+              <a:rPr lang="en-US" sz="1000" dirty="0" smtClean="0">
+                <a:solidFill>
+                  <a:schemeClr val="tx1"/>
+                </a:solidFill>
+                <a:latin typeface="Century Gothic" charset="0"/>
+                <a:ea typeface="Century Gothic" charset="0"/>
+                <a:cs typeface="Century Gothic" charset="0"/>
+              </a:rPr>
+              <a:t>The abstract rules governing how things behave or interrelate within this system boundary.</a:t>
+            </a:r>
+            <a:endParaRPr lang="en-US" sz="1000" dirty="0">
+              <a:solidFill>
+                <a:schemeClr val="tx1"/>
+              </a:solidFill>
+              <a:latin typeface="Century Gothic" charset="0"/>
+              <a:ea typeface="Century Gothic" charset="0"/>
+              <a:cs typeface="Century Gothic" charset="0"/>
+            </a:endParaRPr>
+          </a:p>
+          <a:p>
+            <a:pPr algn="ctr"/>
+            <a:endParaRPr lang="en-US" sz="1000" dirty="0" smtClean="0">
+              <a:solidFill>
+                <a:schemeClr val="tx1"/>
+              </a:solidFill>
+              <a:latin typeface="Century Gothic" charset="0"/>
+              <a:ea typeface="Century Gothic" charset="0"/>
+              <a:cs typeface="Century Gothic" charset="0"/>
+            </a:endParaRPr>
+          </a:p>
+          <a:p>
+            <a:pPr algn="ctr"/>
+            <a:r>
+              <a:rPr lang="en-US" sz="1000" dirty="0" smtClean="0">
+                <a:solidFill>
+                  <a:schemeClr val="tx1"/>
+                </a:solidFill>
+                <a:latin typeface="Century Gothic" charset="0"/>
+                <a:ea typeface="Century Gothic" charset="0"/>
+                <a:cs typeface="Century Gothic" charset="0"/>
+              </a:rPr>
+              <a:t>Answers the question: </a:t>
+            </a:r>
+            <a:r>
+              <a:rPr lang="en-US" sz="1000" i="1" dirty="0" smtClean="0">
+                <a:solidFill>
+                  <a:schemeClr val="tx1"/>
+                </a:solidFill>
+                <a:latin typeface="Century Gothic" charset="0"/>
+                <a:ea typeface="Century Gothic" charset="0"/>
+                <a:cs typeface="Century Gothic" charset="0"/>
+              </a:rPr>
+              <a:t>We leverage _____ to maintain or change the system.</a:t>
+            </a:r>
+          </a:p>
+          <a:p>
+            <a:pPr algn="ctr"/>
+            <a:endParaRPr lang="en-US" sz="1000" dirty="0">
+              <a:solidFill>
+                <a:schemeClr val="tx1"/>
+              </a:solidFill>
+              <a:latin typeface="Century Gothic" charset="0"/>
+              <a:ea typeface="Century Gothic" charset="0"/>
+              <a:cs typeface="Century Gothic" charset="0"/>
+            </a:endParaRPr>
+          </a:p>
+          <a:p>
+            <a:pPr algn="ctr"/>
+            <a:r>
+              <a:rPr lang="en-US" sz="2800" b="1" dirty="0" smtClean="0">
+                <a:solidFill>
+                  <a:schemeClr val="tx1"/>
+                </a:solidFill>
+                <a:latin typeface="Century Gothic" charset="0"/>
+                <a:ea typeface="Century Gothic" charset="0"/>
+                <a:cs typeface="Century Gothic" charset="0"/>
+              </a:rPr>
+              <a:t>Practices</a:t>
+            </a:r>
+          </a:p>
+          <a:p>
+            <a:pPr algn="ctr"/>
+            <a:r>
+              <a:rPr lang="en-US" sz="1000" dirty="0" smtClean="0">
+                <a:solidFill>
+                  <a:schemeClr val="tx1"/>
+                </a:solidFill>
+                <a:latin typeface="Century Gothic" charset="0"/>
+                <a:ea typeface="Century Gothic" charset="0"/>
+                <a:cs typeface="Century Gothic" charset="0"/>
+              </a:rPr>
+              <a:t>The structures used and things done in order to achieve or measure progress.</a:t>
+            </a:r>
+          </a:p>
+          <a:p>
+            <a:pPr algn="ctr"/>
+            <a:endParaRPr lang="en-US" sz="1000" dirty="0">
+              <a:solidFill>
+                <a:schemeClr val="tx1"/>
+              </a:solidFill>
+              <a:latin typeface="Century Gothic" charset="0"/>
+              <a:ea typeface="Century Gothic" charset="0"/>
+              <a:cs typeface="Century Gothic" charset="0"/>
+            </a:endParaRPr>
+          </a:p>
+          <a:p>
+            <a:pPr algn="ctr"/>
+            <a:r>
+              <a:rPr lang="en-US" sz="1000" dirty="0" smtClean="0">
+                <a:solidFill>
+                  <a:schemeClr val="tx1"/>
+                </a:solidFill>
+                <a:latin typeface="Century Gothic" charset="0"/>
+                <a:ea typeface="Century Gothic" charset="0"/>
+                <a:cs typeface="Century Gothic" charset="0"/>
+              </a:rPr>
+              <a:t>Answers the question: </a:t>
+            </a:r>
+            <a:r>
+              <a:rPr lang="en-US" sz="1000" i="1" dirty="0" smtClean="0">
+                <a:solidFill>
+                  <a:schemeClr val="tx1"/>
+                </a:solidFill>
+                <a:latin typeface="Century Gothic" charset="0"/>
+                <a:ea typeface="Century Gothic" charset="0"/>
+                <a:cs typeface="Century Gothic" charset="0"/>
+              </a:rPr>
+              <a:t>We do _____ to create or increase value.</a:t>
+            </a:r>
+          </a:p>
+          <a:p>
+            <a:pPr algn="ctr"/>
+            <a:endParaRPr lang="en-US" sz="1000" i="1" dirty="0">
+              <a:solidFill>
+                <a:schemeClr val="tx1"/>
+              </a:solidFill>
+              <a:latin typeface="Century Gothic" charset="0"/>
+              <a:ea typeface="Century Gothic" charset="0"/>
+              <a:cs typeface="Century Gothic" charset="0"/>
+            </a:endParaRPr>
+          </a:p>
+          <a:p>
+            <a:pPr algn="ctr"/>
+            <a:r>
+              <a:rPr lang="en-US" sz="2800" b="1" dirty="0" smtClean="0">
+                <a:solidFill>
+                  <a:schemeClr val="tx1"/>
+                </a:solidFill>
+                <a:latin typeface="Century Gothic" charset="0"/>
+                <a:ea typeface="Century Gothic" charset="0"/>
+                <a:cs typeface="Century Gothic" charset="0"/>
+              </a:rPr>
+              <a:t>Tools</a:t>
+            </a:r>
+          </a:p>
+          <a:p>
+            <a:pPr algn="ctr"/>
+            <a:r>
+              <a:rPr lang="en-US" sz="1000" dirty="0" smtClean="0">
+                <a:solidFill>
+                  <a:schemeClr val="tx1"/>
+                </a:solidFill>
+                <a:latin typeface="Century Gothic" charset="0"/>
+                <a:ea typeface="Century Gothic" charset="0"/>
+                <a:cs typeface="Century Gothic" charset="0"/>
+              </a:rPr>
+              <a:t>The things we use to do a Practice, or to automate away the menial, error prone or repetitive parts.</a:t>
+            </a:r>
+          </a:p>
+          <a:p>
+            <a:pPr algn="ctr"/>
+            <a:endParaRPr lang="en-US" sz="1000" dirty="0">
+              <a:solidFill>
+                <a:schemeClr val="tx1"/>
+              </a:solidFill>
+              <a:latin typeface="Century Gothic" charset="0"/>
+              <a:ea typeface="Century Gothic" charset="0"/>
+              <a:cs typeface="Century Gothic" charset="0"/>
+            </a:endParaRPr>
+          </a:p>
+          <a:p>
+            <a:pPr algn="ctr"/>
+            <a:r>
+              <a:rPr lang="en-US" sz="1000" dirty="0" smtClean="0">
+                <a:solidFill>
+                  <a:schemeClr val="tx1"/>
+                </a:solidFill>
+                <a:latin typeface="Century Gothic" charset="0"/>
+                <a:ea typeface="Century Gothic" charset="0"/>
+                <a:cs typeface="Century Gothic" charset="0"/>
+              </a:rPr>
+              <a:t>Answers the question: </a:t>
+            </a:r>
+            <a:r>
+              <a:rPr lang="en-US" sz="1000" i="1" dirty="0" smtClean="0">
+                <a:solidFill>
+                  <a:schemeClr val="tx1"/>
+                </a:solidFill>
+                <a:latin typeface="Century Gothic" charset="0"/>
+                <a:ea typeface="Century Gothic" charset="0"/>
+                <a:cs typeface="Century Gothic" charset="0"/>
+              </a:rPr>
+              <a:t>We use _____ to get things done more efficiently.</a:t>
+            </a:r>
+            <a:endParaRPr lang="en-US" sz="1000" i="1" dirty="0">
+              <a:solidFill>
+                <a:schemeClr val="tx1"/>
+              </a:solidFill>
+              <a:latin typeface="Century Gothic" charset="0"/>
+              <a:ea typeface="Century Gothic" charset="0"/>
+              <a:cs typeface="Century Gothic" charset="0"/>
+            </a:endParaRPr>
+          </a:p>
+        </p:txBody>
+      </p:sp>
+      <p:sp>
+        <p:nvSpPr>
+          <p:cNvPr id="13" name="Rectangle 12"/>
+          <p:cNvSpPr/>
+          <p:nvPr/>
+        </p:nvSpPr>
+        <p:spPr>
+          <a:xfrm>
+            <a:off x="2988043" y="7500"/>
+            <a:ext cx="4765583" cy="1149243"/>
+          </a:xfrm>
+          <a:prstGeom prst="rect">
+            <a:avLst/>
+          </a:prstGeom>
+          <a:solidFill>
+            <a:schemeClr val="bg1">
+              <a:lumMod val="75000"/>
+            </a:schemeClr>
+          </a:solidFill>
+          <a:ln>
+            <a:solidFill>
+              <a:schemeClr val="tx1"/>
+            </a:solidFill>
+          </a:ln>
+        </p:spPr>
+        <p:style>
+          <a:lnRef idx="2">
+            <a:schemeClr val="accent1">
+              <a:shade val="50000"/>
+            </a:schemeClr>
+          </a:lnRef>
+          <a:fillRef idx="1">
+            <a:schemeClr val="accent1"/>
+          </a:fillRef>
+          <a:effectRef idx="0">
+            <a:schemeClr val="accent1"/>
+          </a:effectRef>
+          <a:fontRef idx="minor">
+            <a:schemeClr val="lt1"/>
+          </a:fontRef>
+        </p:style>
+        <p:txBody>
+          <a:bodyPr rtlCol="0" anchor="t"/>
+          <a:lstStyle/>
+          <a:p>
+            <a:endParaRPr lang="en-US" sz="1400" dirty="0" smtClean="0">
+              <a:solidFill>
+                <a:schemeClr val="tx1"/>
+              </a:solidFill>
+              <a:latin typeface="Century Gothic" charset="0"/>
+              <a:ea typeface="Century Gothic" charset="0"/>
+              <a:cs typeface="Century Gothic" charset="0"/>
+            </a:endParaRPr>
+          </a:p>
+        </p:txBody>
+      </p:sp>
+      <p:sp>
+        <p:nvSpPr>
+          <p:cNvPr id="14" name="Rectangle 13"/>
+          <p:cNvSpPr/>
+          <p:nvPr/>
+        </p:nvSpPr>
+        <p:spPr>
+          <a:xfrm>
+            <a:off x="10485266" y="-2579"/>
+            <a:ext cx="2318026" cy="1155600"/>
+          </a:xfrm>
+          <a:prstGeom prst="rect">
+            <a:avLst/>
+          </a:prstGeom>
+          <a:noFill/>
+          <a:ln>
+            <a:solidFill>
+              <a:schemeClr val="tx1"/>
+            </a:solidFill>
+          </a:ln>
+        </p:spPr>
+        <p:style>
+          <a:lnRef idx="2">
+            <a:schemeClr val="accent1">
+              <a:shade val="50000"/>
+            </a:schemeClr>
+          </a:lnRef>
+          <a:fillRef idx="1">
+            <a:schemeClr val="accent1"/>
+          </a:fillRef>
+          <a:effectRef idx="0">
+            <a:schemeClr val="accent1"/>
+          </a:effectRef>
+          <a:fontRef idx="minor">
+            <a:schemeClr val="lt1"/>
+          </a:fontRef>
+        </p:style>
+        <p:txBody>
+          <a:bodyPr rot="0" spcFirstLastPara="0" vertOverflow="overflow" horzOverflow="overflow" vert="horz" wrap="square" lIns="91440" tIns="45720" rIns="91440" bIns="45720" numCol="1" spcCol="0" rtlCol="0" fromWordArt="0" anchor="t" anchorCtr="0" forceAA="0" compatLnSpc="1">
+            <a:prstTxWarp prst="textNoShape">
+              <a:avLst/>
+            </a:prstTxWarp>
+            <a:noAutofit/>
+          </a:bodyPr>
+          <a:lstStyle/>
+          <a:p>
+            <a:r>
+              <a:rPr lang="en-US" sz="1400" dirty="0" smtClean="0">
+                <a:solidFill>
+                  <a:schemeClr val="tx1"/>
+                </a:solidFill>
+                <a:latin typeface="Century Gothic" charset="0"/>
+                <a:ea typeface="Century Gothic" charset="0"/>
+                <a:cs typeface="Century Gothic" charset="0"/>
+              </a:rPr>
+              <a:t>Need Perspectives:</a:t>
+            </a:r>
+            <a:endParaRPr lang="en-US" sz="1400" dirty="0" smtClean="0">
+              <a:solidFill>
+                <a:schemeClr val="tx1"/>
+              </a:solidFill>
+              <a:latin typeface="Century Gothic" charset="0"/>
+              <a:ea typeface="Century Gothic" charset="0"/>
+              <a:cs typeface="Century Gothic" charset="0"/>
+            </a:endParaRPr>
+          </a:p>
+          <a:p>
+            <a:endParaRPr lang="en-US" sz="1400" dirty="0">
+              <a:solidFill>
+                <a:schemeClr val="tx1"/>
+              </a:solidFill>
+              <a:latin typeface="Century Gothic" charset="0"/>
+              <a:ea typeface="Century Gothic" charset="0"/>
+              <a:cs typeface="Century Gothic" charset="0"/>
+            </a:endParaRPr>
+          </a:p>
+          <a:p>
+            <a:r>
+              <a:rPr lang="en-US" sz="1000" dirty="0" smtClean="0">
+                <a:solidFill>
+                  <a:schemeClr val="tx1"/>
+                </a:solidFill>
+                <a:latin typeface="Courier New" charset="0"/>
+                <a:ea typeface="Courier New" charset="0"/>
+                <a:cs typeface="Courier New" charset="0"/>
+              </a:rPr>
+              <a:t>[I] </a:t>
+            </a:r>
+            <a:r>
+              <a:rPr lang="en-US" sz="1000" dirty="0" smtClean="0">
+                <a:solidFill>
+                  <a:schemeClr val="tx1"/>
+                </a:solidFill>
+                <a:latin typeface="Century Gothic" charset="0"/>
+                <a:ea typeface="Century Gothic" charset="0"/>
+                <a:cs typeface="Century Gothic" charset="0"/>
+              </a:rPr>
+              <a:t>Inside </a:t>
+            </a:r>
+            <a:r>
+              <a:rPr lang="en-US" sz="1000" dirty="0" smtClean="0">
+                <a:solidFill>
+                  <a:schemeClr val="tx1"/>
+                </a:solidFill>
+                <a:latin typeface="Century Gothic" charset="0"/>
+                <a:ea typeface="Century Gothic" charset="0"/>
+                <a:cs typeface="Century Gothic" charset="0"/>
+              </a:rPr>
+              <a:t>the system boundary</a:t>
+            </a:r>
+          </a:p>
+          <a:p>
+            <a:r>
+              <a:rPr lang="en-US" sz="1000" dirty="0" smtClean="0">
+                <a:solidFill>
+                  <a:schemeClr val="tx1"/>
+                </a:solidFill>
+                <a:latin typeface="Courier New" charset="0"/>
+                <a:ea typeface="Courier New" charset="0"/>
+                <a:cs typeface="Courier New" charset="0"/>
+              </a:rPr>
+              <a:t>[O] </a:t>
+            </a:r>
+            <a:r>
+              <a:rPr lang="en-US" sz="1000" dirty="0" smtClean="0">
+                <a:solidFill>
+                  <a:schemeClr val="tx1"/>
+                </a:solidFill>
+                <a:latin typeface="Century Gothic" charset="0"/>
+                <a:ea typeface="Century Gothic" charset="0"/>
+                <a:cs typeface="Century Gothic" charset="0"/>
+              </a:rPr>
+              <a:t>Outside </a:t>
+            </a:r>
+            <a:r>
+              <a:rPr lang="en-US" sz="1000" dirty="0" smtClean="0">
+                <a:solidFill>
+                  <a:schemeClr val="tx1"/>
+                </a:solidFill>
+                <a:latin typeface="Century Gothic" charset="0"/>
+                <a:ea typeface="Century Gothic" charset="0"/>
+                <a:cs typeface="Century Gothic" charset="0"/>
+              </a:rPr>
+              <a:t>the system boundary</a:t>
+            </a:r>
+          </a:p>
+          <a:p>
+            <a:r>
+              <a:rPr lang="en-US" sz="1000" dirty="0" smtClean="0">
+                <a:solidFill>
+                  <a:schemeClr val="tx1"/>
+                </a:solidFill>
+                <a:latin typeface="Courier New" charset="0"/>
+                <a:ea typeface="Courier New" charset="0"/>
+                <a:cs typeface="Courier New" charset="0"/>
+              </a:rPr>
+              <a:t>[P] </a:t>
+            </a:r>
+            <a:r>
+              <a:rPr lang="en-US" sz="1000" dirty="0" smtClean="0">
+                <a:solidFill>
+                  <a:schemeClr val="tx1"/>
+                </a:solidFill>
+                <a:latin typeface="Century Gothic" charset="0"/>
+                <a:ea typeface="Century Gothic" charset="0"/>
+                <a:cs typeface="Century Gothic" charset="0"/>
+              </a:rPr>
+              <a:t>Personal</a:t>
+            </a:r>
+            <a:endParaRPr lang="en-US" sz="1000" dirty="0" smtClean="0">
+              <a:solidFill>
+                <a:schemeClr val="tx1"/>
+              </a:solidFill>
+              <a:latin typeface="Century Gothic" charset="0"/>
+              <a:ea typeface="Century Gothic" charset="0"/>
+              <a:cs typeface="Century Gothic" charset="0"/>
+            </a:endParaRPr>
+          </a:p>
+        </p:txBody>
+      </p:sp>
+      <p:sp>
+        <p:nvSpPr>
+          <p:cNvPr id="15" name="Rectangle 14"/>
+          <p:cNvSpPr/>
+          <p:nvPr/>
+        </p:nvSpPr>
+        <p:spPr>
+          <a:xfrm>
+            <a:off x="7759269" y="4364"/>
+            <a:ext cx="2718095" cy="1149243"/>
+          </a:xfrm>
+          <a:prstGeom prst="rect">
+            <a:avLst/>
+          </a:prstGeom>
+          <a:noFill/>
+          <a:ln>
+            <a:solidFill>
+              <a:schemeClr val="tx1"/>
+            </a:solidFill>
+          </a:ln>
+        </p:spPr>
+        <p:style>
+          <a:lnRef idx="2">
+            <a:schemeClr val="accent1">
+              <a:shade val="50000"/>
+            </a:schemeClr>
+          </a:lnRef>
+          <a:fillRef idx="1">
+            <a:schemeClr val="accent1"/>
+          </a:fillRef>
+          <a:effectRef idx="0">
+            <a:schemeClr val="accent1"/>
+          </a:effectRef>
+          <a:fontRef idx="minor">
+            <a:schemeClr val="lt1"/>
+          </a:fontRef>
+        </p:style>
+        <p:txBody>
+          <a:bodyPr rot="0" spcFirstLastPara="0" vertOverflow="overflow" horzOverflow="overflow" vert="horz" wrap="square" lIns="91440" tIns="45720" rIns="91440" bIns="45720" numCol="1" spcCol="0" rtlCol="0" fromWordArt="0" anchor="t" anchorCtr="0" forceAA="0" compatLnSpc="1">
+            <a:prstTxWarp prst="textNoShape">
+              <a:avLst/>
+            </a:prstTxWarp>
+            <a:noAutofit/>
+          </a:bodyPr>
+          <a:lstStyle/>
+          <a:p>
+            <a:r>
+              <a:rPr lang="en-US" sz="1400" dirty="0">
+                <a:solidFill>
+                  <a:schemeClr val="tx1"/>
+                </a:solidFill>
+                <a:latin typeface="Century Gothic" charset="0"/>
+                <a:ea typeface="Century Gothic" charset="0"/>
+                <a:cs typeface="Century Gothic" charset="0"/>
+              </a:rPr>
+              <a:t>Time-scale</a:t>
+            </a:r>
+            <a:r>
+              <a:rPr lang="en-US" sz="1400" dirty="0" smtClean="0">
+                <a:solidFill>
+                  <a:schemeClr val="tx1"/>
+                </a:solidFill>
+                <a:latin typeface="Century Gothic" charset="0"/>
+                <a:ea typeface="Century Gothic" charset="0"/>
+                <a:cs typeface="Century Gothic" charset="0"/>
+              </a:rPr>
+              <a:t>:</a:t>
+            </a:r>
+          </a:p>
+          <a:p>
+            <a:endParaRPr lang="en-US" sz="1400" dirty="0">
+              <a:solidFill>
+                <a:schemeClr val="tx1"/>
+              </a:solidFill>
+              <a:latin typeface="Century Gothic" charset="0"/>
+              <a:ea typeface="Century Gothic" charset="0"/>
+              <a:cs typeface="Century Gothic" charset="0"/>
+            </a:endParaRPr>
+          </a:p>
+          <a:p>
+            <a:pPr marL="171450" indent="-171450">
+              <a:buFont typeface="Wingdings" charset="2"/>
+              <a:buChar char="q"/>
+            </a:pPr>
+            <a:r>
+              <a:rPr lang="en-US" sz="1000" dirty="0" smtClean="0">
+                <a:solidFill>
+                  <a:schemeClr val="tx1"/>
+                </a:solidFill>
+                <a:latin typeface="Century Gothic" charset="0"/>
+                <a:ea typeface="Century Gothic" charset="0"/>
+                <a:cs typeface="Century Gothic" charset="0"/>
+              </a:rPr>
+              <a:t>Now (snapshot)</a:t>
+            </a:r>
+          </a:p>
+          <a:p>
+            <a:pPr marL="171450" indent="-171450">
+              <a:buFont typeface="Wingdings" charset="2"/>
+              <a:buChar char="q"/>
+            </a:pPr>
+            <a:r>
+              <a:rPr lang="en-US" sz="1000" dirty="0" smtClean="0">
+                <a:solidFill>
+                  <a:schemeClr val="tx1"/>
+                </a:solidFill>
+                <a:latin typeface="Century Gothic" charset="0"/>
+                <a:ea typeface="Century Gothic" charset="0"/>
+                <a:cs typeface="Century Gothic" charset="0"/>
+              </a:rPr>
+              <a:t>Future (Period: _____________)</a:t>
+            </a:r>
+          </a:p>
+          <a:p>
+            <a:pPr marL="171450" indent="-171450">
+              <a:buFont typeface="Wingdings" charset="2"/>
+              <a:buChar char="q"/>
+            </a:pPr>
+            <a:r>
+              <a:rPr lang="en-US" sz="1000" dirty="0" smtClean="0">
+                <a:solidFill>
+                  <a:schemeClr val="tx1"/>
+                </a:solidFill>
+                <a:latin typeface="Century Gothic" charset="0"/>
+                <a:ea typeface="Century Gothic" charset="0"/>
+                <a:cs typeface="Century Gothic" charset="0"/>
+              </a:rPr>
+              <a:t>Past (historical record)</a:t>
+            </a:r>
+          </a:p>
+        </p:txBody>
+      </p:sp>
+      <p:sp>
+        <p:nvSpPr>
+          <p:cNvPr id="17" name="Rounded Rectangle 16"/>
+          <p:cNvSpPr/>
+          <p:nvPr/>
+        </p:nvSpPr>
+        <p:spPr>
+          <a:xfrm>
+            <a:off x="2993687" y="2500"/>
+            <a:ext cx="4757609" cy="1154243"/>
+          </a:xfrm>
+          <a:prstGeom prst="roundRect">
+            <a:avLst/>
+          </a:prstGeom>
+          <a:solidFill>
+            <a:schemeClr val="bg1"/>
+          </a:solidFill>
+          <a:ln>
+            <a:solidFill>
+              <a:schemeClr val="tx1"/>
+            </a:solidFill>
+          </a:ln>
+        </p:spPr>
+        <p:style>
+          <a:lnRef idx="2">
+            <a:schemeClr val="accent1">
+              <a:shade val="50000"/>
+            </a:schemeClr>
+          </a:lnRef>
+          <a:fillRef idx="1">
+            <a:schemeClr val="accent1"/>
+          </a:fillRef>
+          <a:effectRef idx="0">
+            <a:schemeClr val="accent1"/>
+          </a:effectRef>
+          <a:fontRef idx="minor">
+            <a:schemeClr val="lt1"/>
+          </a:fontRef>
+        </p:style>
+        <p:txBody>
+          <a:bodyPr rtlCol="0" anchor="ctr"/>
+          <a:lstStyle/>
+          <a:p>
+            <a:pPr algn="ctr"/>
+            <a:r>
+              <a:rPr lang="en-US" sz="1400" dirty="0" smtClean="0">
+                <a:solidFill>
+                  <a:schemeClr val="bg1">
+                    <a:lumMod val="75000"/>
+                  </a:schemeClr>
+                </a:solidFill>
+                <a:latin typeface="Century Gothic" charset="0"/>
+                <a:ea typeface="Century Gothic" charset="0"/>
+                <a:cs typeface="Century Gothic" charset="0"/>
+              </a:rPr>
+              <a:t>System Boundary</a:t>
+            </a:r>
+            <a:endParaRPr lang="en-US" sz="1400" dirty="0">
+              <a:solidFill>
+                <a:schemeClr val="bg1">
+                  <a:lumMod val="75000"/>
+                </a:schemeClr>
+              </a:solidFill>
+              <a:latin typeface="Century Gothic" charset="0"/>
+              <a:ea typeface="Century Gothic" charset="0"/>
+              <a:cs typeface="Century Gothic" charset="0"/>
+            </a:endParaRPr>
+          </a:p>
+        </p:txBody>
+      </p:sp>
+      <p:sp>
+        <p:nvSpPr>
+          <p:cNvPr id="18" name="Rectangle 17"/>
+          <p:cNvSpPr/>
+          <p:nvPr/>
+        </p:nvSpPr>
+        <p:spPr>
+          <a:xfrm>
+            <a:off x="2983043" y="1164244"/>
+            <a:ext cx="9818557" cy="8436956"/>
+          </a:xfrm>
+          <a:prstGeom prst="rect">
+            <a:avLst/>
+          </a:prstGeom>
+          <a:noFill/>
+          <a:ln>
+            <a:solidFill>
+              <a:schemeClr val="tx1"/>
+            </a:solidFill>
+          </a:ln>
+        </p:spPr>
+        <p:style>
+          <a:lnRef idx="2">
+            <a:schemeClr val="accent1">
+              <a:shade val="50000"/>
+            </a:schemeClr>
+          </a:lnRef>
+          <a:fillRef idx="1">
+            <a:schemeClr val="accent1"/>
+          </a:fillRef>
+          <a:effectRef idx="0">
+            <a:schemeClr val="accent1"/>
+          </a:effectRef>
+          <a:fontRef idx="minor">
+            <a:schemeClr val="lt1"/>
+          </a:fontRef>
+        </p:style>
+        <p:txBody>
+          <a:bodyPr rot="0" spcFirstLastPara="0" vertOverflow="overflow" horzOverflow="overflow" vert="horz" wrap="square" lIns="91440" tIns="45720" rIns="91440" bIns="45720" numCol="1" spcCol="0" rtlCol="0" fromWordArt="0" anchor="t" anchorCtr="0" forceAA="0" compatLnSpc="1">
+            <a:prstTxWarp prst="textNoShape">
+              <a:avLst/>
+            </a:prstTxWarp>
+            <a:noAutofit/>
+          </a:bodyPr>
+          <a:lstStyle/>
+          <a:p>
+            <a:endParaRPr lang="en-US" sz="1000" dirty="0" smtClean="0">
+              <a:solidFill>
+                <a:schemeClr val="tx1"/>
+              </a:solidFill>
+              <a:latin typeface="Century Gothic" charset="0"/>
+              <a:ea typeface="Century Gothic" charset="0"/>
+              <a:cs typeface="Century Gothic" charset="0"/>
+            </a:endParaRPr>
+          </a:p>
+        </p:txBody>
+      </p:sp>
+      <p:cxnSp>
+        <p:nvCxnSpPr>
+          <p:cNvPr id="20" name="Straight Connector 19"/>
+          <p:cNvCxnSpPr>
+            <a:cxnSpLocks/>
+          </p:cNvCxnSpPr>
+          <p:nvPr/>
+        </p:nvCxnSpPr>
+        <p:spPr>
+          <a:xfrm flipV="1">
+            <a:off x="2989393" y="1403683"/>
+            <a:ext cx="9817200" cy="12031"/>
+          </a:xfrm>
+          <a:prstGeom prst="line">
+            <a:avLst/>
+          </a:prstGeom>
+          <a:ln>
+            <a:solidFill>
+              <a:schemeClr val="bg2"/>
+            </a:solidFill>
+          </a:ln>
+        </p:spPr>
+        <p:style>
+          <a:lnRef idx="1">
+            <a:schemeClr val="accent1"/>
+          </a:lnRef>
+          <a:fillRef idx="0">
+            <a:schemeClr val="accent1"/>
+          </a:fillRef>
+          <a:effectRef idx="0">
+            <a:schemeClr val="accent1"/>
+          </a:effectRef>
+          <a:fontRef idx="minor">
+            <a:schemeClr val="tx1"/>
+          </a:fontRef>
+        </p:style>
+      </p:cxnSp>
+      <p:cxnSp>
+        <p:nvCxnSpPr>
+          <p:cNvPr id="27" name="Straight Connector 26"/>
+          <p:cNvCxnSpPr>
+            <a:cxnSpLocks/>
+          </p:cNvCxnSpPr>
+          <p:nvPr/>
+        </p:nvCxnSpPr>
+        <p:spPr>
+          <a:xfrm flipV="1">
+            <a:off x="2992301" y="1644816"/>
+            <a:ext cx="9817200" cy="12031"/>
+          </a:xfrm>
+          <a:prstGeom prst="line">
+            <a:avLst/>
+          </a:prstGeom>
+          <a:ln>
+            <a:solidFill>
+              <a:schemeClr val="bg2"/>
+            </a:solidFill>
+          </a:ln>
+        </p:spPr>
+        <p:style>
+          <a:lnRef idx="1">
+            <a:schemeClr val="accent1"/>
+          </a:lnRef>
+          <a:fillRef idx="0">
+            <a:schemeClr val="accent1"/>
+          </a:fillRef>
+          <a:effectRef idx="0">
+            <a:schemeClr val="accent1"/>
+          </a:effectRef>
+          <a:fontRef idx="minor">
+            <a:schemeClr val="tx1"/>
+          </a:fontRef>
+        </p:style>
+      </p:cxnSp>
+      <p:cxnSp>
+        <p:nvCxnSpPr>
+          <p:cNvPr id="52" name="Straight Connector 51"/>
+          <p:cNvCxnSpPr>
+            <a:cxnSpLocks/>
+          </p:cNvCxnSpPr>
+          <p:nvPr/>
+        </p:nvCxnSpPr>
+        <p:spPr>
+          <a:xfrm flipV="1">
+            <a:off x="2989393" y="1885949"/>
+            <a:ext cx="9817200" cy="12031"/>
+          </a:xfrm>
+          <a:prstGeom prst="line">
+            <a:avLst/>
+          </a:prstGeom>
+          <a:ln>
+            <a:solidFill>
+              <a:schemeClr val="bg2"/>
+            </a:solidFill>
+          </a:ln>
+        </p:spPr>
+        <p:style>
+          <a:lnRef idx="1">
+            <a:schemeClr val="accent1"/>
+          </a:lnRef>
+          <a:fillRef idx="0">
+            <a:schemeClr val="accent1"/>
+          </a:fillRef>
+          <a:effectRef idx="0">
+            <a:schemeClr val="accent1"/>
+          </a:effectRef>
+          <a:fontRef idx="minor">
+            <a:schemeClr val="tx1"/>
+          </a:fontRef>
+        </p:style>
+      </p:cxnSp>
+      <p:cxnSp>
+        <p:nvCxnSpPr>
+          <p:cNvPr id="53" name="Straight Connector 52"/>
+          <p:cNvCxnSpPr>
+            <a:cxnSpLocks/>
+          </p:cNvCxnSpPr>
+          <p:nvPr/>
+        </p:nvCxnSpPr>
+        <p:spPr>
+          <a:xfrm flipV="1">
+            <a:off x="2992301" y="2127082"/>
+            <a:ext cx="9817200" cy="12031"/>
+          </a:xfrm>
+          <a:prstGeom prst="line">
+            <a:avLst/>
+          </a:prstGeom>
+          <a:ln>
+            <a:solidFill>
+              <a:schemeClr val="bg2"/>
+            </a:solidFill>
+          </a:ln>
+        </p:spPr>
+        <p:style>
+          <a:lnRef idx="1">
+            <a:schemeClr val="accent1"/>
+          </a:lnRef>
+          <a:fillRef idx="0">
+            <a:schemeClr val="accent1"/>
+          </a:fillRef>
+          <a:effectRef idx="0">
+            <a:schemeClr val="accent1"/>
+          </a:effectRef>
+          <a:fontRef idx="minor">
+            <a:schemeClr val="tx1"/>
+          </a:fontRef>
+        </p:style>
+      </p:cxnSp>
+      <p:cxnSp>
+        <p:nvCxnSpPr>
+          <p:cNvPr id="54" name="Straight Connector 53"/>
+          <p:cNvCxnSpPr>
+            <a:cxnSpLocks/>
+          </p:cNvCxnSpPr>
+          <p:nvPr/>
+        </p:nvCxnSpPr>
+        <p:spPr>
+          <a:xfrm flipV="1">
+            <a:off x="2989393" y="2368215"/>
+            <a:ext cx="9817200" cy="12031"/>
+          </a:xfrm>
+          <a:prstGeom prst="line">
+            <a:avLst/>
+          </a:prstGeom>
+          <a:ln>
+            <a:solidFill>
+              <a:schemeClr val="bg2"/>
+            </a:solidFill>
+          </a:ln>
+        </p:spPr>
+        <p:style>
+          <a:lnRef idx="1">
+            <a:schemeClr val="accent1"/>
+          </a:lnRef>
+          <a:fillRef idx="0">
+            <a:schemeClr val="accent1"/>
+          </a:fillRef>
+          <a:effectRef idx="0">
+            <a:schemeClr val="accent1"/>
+          </a:effectRef>
+          <a:fontRef idx="minor">
+            <a:schemeClr val="tx1"/>
+          </a:fontRef>
+        </p:style>
+      </p:cxnSp>
+      <p:cxnSp>
+        <p:nvCxnSpPr>
+          <p:cNvPr id="55" name="Straight Connector 54"/>
+          <p:cNvCxnSpPr>
+            <a:cxnSpLocks/>
+          </p:cNvCxnSpPr>
+          <p:nvPr/>
+        </p:nvCxnSpPr>
+        <p:spPr>
+          <a:xfrm flipV="1">
+            <a:off x="2992301" y="2609348"/>
+            <a:ext cx="9817200" cy="12031"/>
+          </a:xfrm>
+          <a:prstGeom prst="line">
+            <a:avLst/>
+          </a:prstGeom>
+          <a:ln>
+            <a:solidFill>
+              <a:schemeClr val="bg2"/>
+            </a:solidFill>
+          </a:ln>
+        </p:spPr>
+        <p:style>
+          <a:lnRef idx="1">
+            <a:schemeClr val="accent1"/>
+          </a:lnRef>
+          <a:fillRef idx="0">
+            <a:schemeClr val="accent1"/>
+          </a:fillRef>
+          <a:effectRef idx="0">
+            <a:schemeClr val="accent1"/>
+          </a:effectRef>
+          <a:fontRef idx="minor">
+            <a:schemeClr val="tx1"/>
+          </a:fontRef>
+        </p:style>
+      </p:cxnSp>
+      <p:cxnSp>
+        <p:nvCxnSpPr>
+          <p:cNvPr id="56" name="Straight Connector 55"/>
+          <p:cNvCxnSpPr>
+            <a:cxnSpLocks/>
+          </p:cNvCxnSpPr>
+          <p:nvPr/>
+        </p:nvCxnSpPr>
+        <p:spPr>
+          <a:xfrm flipV="1">
+            <a:off x="2989393" y="2850481"/>
+            <a:ext cx="9817200" cy="12031"/>
+          </a:xfrm>
+          <a:prstGeom prst="line">
+            <a:avLst/>
+          </a:prstGeom>
+          <a:ln>
+            <a:solidFill>
+              <a:schemeClr val="bg2"/>
+            </a:solidFill>
+          </a:ln>
+        </p:spPr>
+        <p:style>
+          <a:lnRef idx="1">
+            <a:schemeClr val="accent1"/>
+          </a:lnRef>
+          <a:fillRef idx="0">
+            <a:schemeClr val="accent1"/>
+          </a:fillRef>
+          <a:effectRef idx="0">
+            <a:schemeClr val="accent1"/>
+          </a:effectRef>
+          <a:fontRef idx="minor">
+            <a:schemeClr val="tx1"/>
+          </a:fontRef>
+        </p:style>
+      </p:cxnSp>
+      <p:cxnSp>
+        <p:nvCxnSpPr>
+          <p:cNvPr id="57" name="Straight Connector 56"/>
+          <p:cNvCxnSpPr>
+            <a:cxnSpLocks/>
+          </p:cNvCxnSpPr>
+          <p:nvPr/>
+        </p:nvCxnSpPr>
+        <p:spPr>
+          <a:xfrm flipV="1">
+            <a:off x="2992301" y="3091614"/>
+            <a:ext cx="9817200" cy="12031"/>
+          </a:xfrm>
+          <a:prstGeom prst="line">
+            <a:avLst/>
+          </a:prstGeom>
+          <a:ln>
+            <a:solidFill>
+              <a:schemeClr val="bg2"/>
+            </a:solidFill>
+          </a:ln>
+        </p:spPr>
+        <p:style>
+          <a:lnRef idx="1">
+            <a:schemeClr val="accent1"/>
+          </a:lnRef>
+          <a:fillRef idx="0">
+            <a:schemeClr val="accent1"/>
+          </a:fillRef>
+          <a:effectRef idx="0">
+            <a:schemeClr val="accent1"/>
+          </a:effectRef>
+          <a:fontRef idx="minor">
+            <a:schemeClr val="tx1"/>
+          </a:fontRef>
+        </p:style>
+      </p:cxnSp>
+      <p:cxnSp>
+        <p:nvCxnSpPr>
+          <p:cNvPr id="58" name="Straight Connector 57"/>
+          <p:cNvCxnSpPr>
+            <a:cxnSpLocks/>
+          </p:cNvCxnSpPr>
+          <p:nvPr/>
+        </p:nvCxnSpPr>
+        <p:spPr>
+          <a:xfrm flipV="1">
+            <a:off x="2975142" y="3332747"/>
+            <a:ext cx="9817200" cy="12031"/>
+          </a:xfrm>
+          <a:prstGeom prst="line">
+            <a:avLst/>
+          </a:prstGeom>
+          <a:ln>
+            <a:solidFill>
+              <a:schemeClr val="bg2"/>
+            </a:solidFill>
+          </a:ln>
+        </p:spPr>
+        <p:style>
+          <a:lnRef idx="1">
+            <a:schemeClr val="accent1"/>
+          </a:lnRef>
+          <a:fillRef idx="0">
+            <a:schemeClr val="accent1"/>
+          </a:fillRef>
+          <a:effectRef idx="0">
+            <a:schemeClr val="accent1"/>
+          </a:effectRef>
+          <a:fontRef idx="minor">
+            <a:schemeClr val="tx1"/>
+          </a:fontRef>
+        </p:style>
+      </p:cxnSp>
+      <p:cxnSp>
+        <p:nvCxnSpPr>
+          <p:cNvPr id="59" name="Straight Connector 58"/>
+          <p:cNvCxnSpPr>
+            <a:cxnSpLocks/>
+          </p:cNvCxnSpPr>
+          <p:nvPr/>
+        </p:nvCxnSpPr>
+        <p:spPr>
+          <a:xfrm flipV="1">
+            <a:off x="2978050" y="3573880"/>
+            <a:ext cx="9817200" cy="12031"/>
+          </a:xfrm>
+          <a:prstGeom prst="line">
+            <a:avLst/>
+          </a:prstGeom>
+          <a:ln>
+            <a:solidFill>
+              <a:schemeClr val="bg2"/>
+            </a:solidFill>
+          </a:ln>
+        </p:spPr>
+        <p:style>
+          <a:lnRef idx="1">
+            <a:schemeClr val="accent1"/>
+          </a:lnRef>
+          <a:fillRef idx="0">
+            <a:schemeClr val="accent1"/>
+          </a:fillRef>
+          <a:effectRef idx="0">
+            <a:schemeClr val="accent1"/>
+          </a:effectRef>
+          <a:fontRef idx="minor">
+            <a:schemeClr val="tx1"/>
+          </a:fontRef>
+        </p:style>
+      </p:cxnSp>
+      <p:cxnSp>
+        <p:nvCxnSpPr>
+          <p:cNvPr id="60" name="Straight Connector 59"/>
+          <p:cNvCxnSpPr>
+            <a:cxnSpLocks/>
+          </p:cNvCxnSpPr>
+          <p:nvPr/>
+        </p:nvCxnSpPr>
+        <p:spPr>
+          <a:xfrm flipV="1">
+            <a:off x="2975142" y="3815013"/>
+            <a:ext cx="9817200" cy="12031"/>
+          </a:xfrm>
+          <a:prstGeom prst="line">
+            <a:avLst/>
+          </a:prstGeom>
+          <a:ln>
+            <a:solidFill>
+              <a:schemeClr val="bg2"/>
+            </a:solidFill>
+          </a:ln>
+        </p:spPr>
+        <p:style>
+          <a:lnRef idx="1">
+            <a:schemeClr val="accent1"/>
+          </a:lnRef>
+          <a:fillRef idx="0">
+            <a:schemeClr val="accent1"/>
+          </a:fillRef>
+          <a:effectRef idx="0">
+            <a:schemeClr val="accent1"/>
+          </a:effectRef>
+          <a:fontRef idx="minor">
+            <a:schemeClr val="tx1"/>
+          </a:fontRef>
+        </p:style>
+      </p:cxnSp>
+      <p:cxnSp>
+        <p:nvCxnSpPr>
+          <p:cNvPr id="61" name="Straight Connector 60"/>
+          <p:cNvCxnSpPr>
+            <a:cxnSpLocks/>
+          </p:cNvCxnSpPr>
+          <p:nvPr/>
+        </p:nvCxnSpPr>
+        <p:spPr>
+          <a:xfrm flipV="1">
+            <a:off x="2978050" y="4056146"/>
+            <a:ext cx="9817200" cy="12031"/>
+          </a:xfrm>
+          <a:prstGeom prst="line">
+            <a:avLst/>
+          </a:prstGeom>
+          <a:ln>
+            <a:solidFill>
+              <a:schemeClr val="bg2"/>
+            </a:solidFill>
+          </a:ln>
+        </p:spPr>
+        <p:style>
+          <a:lnRef idx="1">
+            <a:schemeClr val="accent1"/>
+          </a:lnRef>
+          <a:fillRef idx="0">
+            <a:schemeClr val="accent1"/>
+          </a:fillRef>
+          <a:effectRef idx="0">
+            <a:schemeClr val="accent1"/>
+          </a:effectRef>
+          <a:fontRef idx="minor">
+            <a:schemeClr val="tx1"/>
+          </a:fontRef>
+        </p:style>
+      </p:cxnSp>
+      <p:cxnSp>
+        <p:nvCxnSpPr>
+          <p:cNvPr id="62" name="Straight Connector 61"/>
+          <p:cNvCxnSpPr>
+            <a:cxnSpLocks/>
+          </p:cNvCxnSpPr>
+          <p:nvPr/>
+        </p:nvCxnSpPr>
+        <p:spPr>
+          <a:xfrm flipV="1">
+            <a:off x="2975142" y="4297279"/>
+            <a:ext cx="9817200" cy="12031"/>
+          </a:xfrm>
+          <a:prstGeom prst="line">
+            <a:avLst/>
+          </a:prstGeom>
+          <a:ln>
+            <a:solidFill>
+              <a:schemeClr val="bg2"/>
+            </a:solidFill>
+          </a:ln>
+        </p:spPr>
+        <p:style>
+          <a:lnRef idx="1">
+            <a:schemeClr val="accent1"/>
+          </a:lnRef>
+          <a:fillRef idx="0">
+            <a:schemeClr val="accent1"/>
+          </a:fillRef>
+          <a:effectRef idx="0">
+            <a:schemeClr val="accent1"/>
+          </a:effectRef>
+          <a:fontRef idx="minor">
+            <a:schemeClr val="tx1"/>
+          </a:fontRef>
+        </p:style>
+      </p:cxnSp>
+      <p:cxnSp>
+        <p:nvCxnSpPr>
+          <p:cNvPr id="63" name="Straight Connector 62"/>
+          <p:cNvCxnSpPr>
+            <a:cxnSpLocks/>
+          </p:cNvCxnSpPr>
+          <p:nvPr/>
+        </p:nvCxnSpPr>
+        <p:spPr>
+          <a:xfrm flipV="1">
+            <a:off x="2978050" y="4538412"/>
+            <a:ext cx="9817200" cy="12031"/>
+          </a:xfrm>
+          <a:prstGeom prst="line">
+            <a:avLst/>
+          </a:prstGeom>
+          <a:ln>
+            <a:solidFill>
+              <a:schemeClr val="bg2"/>
+            </a:solidFill>
+          </a:ln>
+        </p:spPr>
+        <p:style>
+          <a:lnRef idx="1">
+            <a:schemeClr val="accent1"/>
+          </a:lnRef>
+          <a:fillRef idx="0">
+            <a:schemeClr val="accent1"/>
+          </a:fillRef>
+          <a:effectRef idx="0">
+            <a:schemeClr val="accent1"/>
+          </a:effectRef>
+          <a:fontRef idx="minor">
+            <a:schemeClr val="tx1"/>
+          </a:fontRef>
+        </p:style>
+      </p:cxnSp>
+      <p:cxnSp>
+        <p:nvCxnSpPr>
+          <p:cNvPr id="64" name="Straight Connector 63"/>
+          <p:cNvCxnSpPr>
+            <a:cxnSpLocks/>
+          </p:cNvCxnSpPr>
+          <p:nvPr/>
+        </p:nvCxnSpPr>
+        <p:spPr>
+          <a:xfrm flipV="1">
+            <a:off x="2975142" y="4779545"/>
+            <a:ext cx="9817200" cy="12031"/>
+          </a:xfrm>
+          <a:prstGeom prst="line">
+            <a:avLst/>
+          </a:prstGeom>
+          <a:ln>
+            <a:solidFill>
+              <a:schemeClr val="bg2"/>
+            </a:solidFill>
+          </a:ln>
+        </p:spPr>
+        <p:style>
+          <a:lnRef idx="1">
+            <a:schemeClr val="accent1"/>
+          </a:lnRef>
+          <a:fillRef idx="0">
+            <a:schemeClr val="accent1"/>
+          </a:fillRef>
+          <a:effectRef idx="0">
+            <a:schemeClr val="accent1"/>
+          </a:effectRef>
+          <a:fontRef idx="minor">
+            <a:schemeClr val="tx1"/>
+          </a:fontRef>
+        </p:style>
+      </p:cxnSp>
+      <p:cxnSp>
+        <p:nvCxnSpPr>
+          <p:cNvPr id="65" name="Straight Connector 64"/>
+          <p:cNvCxnSpPr>
+            <a:cxnSpLocks/>
+          </p:cNvCxnSpPr>
+          <p:nvPr/>
+        </p:nvCxnSpPr>
+        <p:spPr>
+          <a:xfrm flipV="1">
+            <a:off x="2978050" y="5020674"/>
+            <a:ext cx="9817200" cy="12031"/>
+          </a:xfrm>
+          <a:prstGeom prst="line">
+            <a:avLst/>
+          </a:prstGeom>
+          <a:ln>
+            <a:solidFill>
+              <a:schemeClr val="bg2"/>
+            </a:solidFill>
+          </a:ln>
+        </p:spPr>
+        <p:style>
+          <a:lnRef idx="1">
+            <a:schemeClr val="accent1"/>
+          </a:lnRef>
+          <a:fillRef idx="0">
+            <a:schemeClr val="accent1"/>
+          </a:fillRef>
+          <a:effectRef idx="0">
+            <a:schemeClr val="accent1"/>
+          </a:effectRef>
+          <a:fontRef idx="minor">
+            <a:schemeClr val="tx1"/>
+          </a:fontRef>
+        </p:style>
+      </p:cxnSp>
+      <p:cxnSp>
+        <p:nvCxnSpPr>
+          <p:cNvPr id="66" name="Straight Connector 65"/>
+          <p:cNvCxnSpPr>
+            <a:cxnSpLocks/>
+          </p:cNvCxnSpPr>
+          <p:nvPr/>
+        </p:nvCxnSpPr>
+        <p:spPr>
+          <a:xfrm flipV="1">
+            <a:off x="3003644" y="5261312"/>
+            <a:ext cx="9817200" cy="12031"/>
+          </a:xfrm>
+          <a:prstGeom prst="line">
+            <a:avLst/>
+          </a:prstGeom>
+          <a:ln>
+            <a:solidFill>
+              <a:schemeClr val="bg2"/>
+            </a:solidFill>
+          </a:ln>
+        </p:spPr>
+        <p:style>
+          <a:lnRef idx="1">
+            <a:schemeClr val="accent1"/>
+          </a:lnRef>
+          <a:fillRef idx="0">
+            <a:schemeClr val="accent1"/>
+          </a:fillRef>
+          <a:effectRef idx="0">
+            <a:schemeClr val="accent1"/>
+          </a:effectRef>
+          <a:fontRef idx="minor">
+            <a:schemeClr val="tx1"/>
+          </a:fontRef>
+        </p:style>
+      </p:cxnSp>
+      <p:cxnSp>
+        <p:nvCxnSpPr>
+          <p:cNvPr id="67" name="Straight Connector 66"/>
+          <p:cNvCxnSpPr>
+            <a:cxnSpLocks/>
+          </p:cNvCxnSpPr>
+          <p:nvPr/>
+        </p:nvCxnSpPr>
+        <p:spPr>
+          <a:xfrm flipV="1">
+            <a:off x="3006552" y="5502445"/>
+            <a:ext cx="9817200" cy="12031"/>
+          </a:xfrm>
+          <a:prstGeom prst="line">
+            <a:avLst/>
+          </a:prstGeom>
+          <a:ln>
+            <a:solidFill>
+              <a:schemeClr val="bg2"/>
+            </a:solidFill>
+          </a:ln>
+        </p:spPr>
+        <p:style>
+          <a:lnRef idx="1">
+            <a:schemeClr val="accent1"/>
+          </a:lnRef>
+          <a:fillRef idx="0">
+            <a:schemeClr val="accent1"/>
+          </a:fillRef>
+          <a:effectRef idx="0">
+            <a:schemeClr val="accent1"/>
+          </a:effectRef>
+          <a:fontRef idx="minor">
+            <a:schemeClr val="tx1"/>
+          </a:fontRef>
+        </p:style>
+      </p:cxnSp>
+      <p:cxnSp>
+        <p:nvCxnSpPr>
+          <p:cNvPr id="68" name="Straight Connector 67"/>
+          <p:cNvCxnSpPr>
+            <a:cxnSpLocks/>
+          </p:cNvCxnSpPr>
+          <p:nvPr/>
+        </p:nvCxnSpPr>
+        <p:spPr>
+          <a:xfrm flipV="1">
+            <a:off x="3003644" y="5743578"/>
+            <a:ext cx="9817200" cy="12031"/>
+          </a:xfrm>
+          <a:prstGeom prst="line">
+            <a:avLst/>
+          </a:prstGeom>
+          <a:ln>
+            <a:solidFill>
+              <a:schemeClr val="bg2"/>
+            </a:solidFill>
+          </a:ln>
+        </p:spPr>
+        <p:style>
+          <a:lnRef idx="1">
+            <a:schemeClr val="accent1"/>
+          </a:lnRef>
+          <a:fillRef idx="0">
+            <a:schemeClr val="accent1"/>
+          </a:fillRef>
+          <a:effectRef idx="0">
+            <a:schemeClr val="accent1"/>
+          </a:effectRef>
+          <a:fontRef idx="minor">
+            <a:schemeClr val="tx1"/>
+          </a:fontRef>
+        </p:style>
+      </p:cxnSp>
+      <p:cxnSp>
+        <p:nvCxnSpPr>
+          <p:cNvPr id="69" name="Straight Connector 68"/>
+          <p:cNvCxnSpPr>
+            <a:cxnSpLocks/>
+          </p:cNvCxnSpPr>
+          <p:nvPr/>
+        </p:nvCxnSpPr>
+        <p:spPr>
+          <a:xfrm flipV="1">
+            <a:off x="3006552" y="5984711"/>
+            <a:ext cx="9817200" cy="12031"/>
+          </a:xfrm>
+          <a:prstGeom prst="line">
+            <a:avLst/>
+          </a:prstGeom>
+          <a:ln>
+            <a:solidFill>
+              <a:schemeClr val="bg2"/>
+            </a:solidFill>
+          </a:ln>
+        </p:spPr>
+        <p:style>
+          <a:lnRef idx="1">
+            <a:schemeClr val="accent1"/>
+          </a:lnRef>
+          <a:fillRef idx="0">
+            <a:schemeClr val="accent1"/>
+          </a:fillRef>
+          <a:effectRef idx="0">
+            <a:schemeClr val="accent1"/>
+          </a:effectRef>
+          <a:fontRef idx="minor">
+            <a:schemeClr val="tx1"/>
+          </a:fontRef>
+        </p:style>
+      </p:cxnSp>
+      <p:cxnSp>
+        <p:nvCxnSpPr>
+          <p:cNvPr id="70" name="Straight Connector 69"/>
+          <p:cNvCxnSpPr>
+            <a:cxnSpLocks/>
+          </p:cNvCxnSpPr>
+          <p:nvPr/>
+        </p:nvCxnSpPr>
+        <p:spPr>
+          <a:xfrm flipV="1">
+            <a:off x="3003644" y="6225844"/>
+            <a:ext cx="9817200" cy="12031"/>
+          </a:xfrm>
+          <a:prstGeom prst="line">
+            <a:avLst/>
+          </a:prstGeom>
+          <a:ln>
+            <a:solidFill>
+              <a:schemeClr val="bg2"/>
+            </a:solidFill>
+          </a:ln>
+        </p:spPr>
+        <p:style>
+          <a:lnRef idx="1">
+            <a:schemeClr val="accent1"/>
+          </a:lnRef>
+          <a:fillRef idx="0">
+            <a:schemeClr val="accent1"/>
+          </a:fillRef>
+          <a:effectRef idx="0">
+            <a:schemeClr val="accent1"/>
+          </a:effectRef>
+          <a:fontRef idx="minor">
+            <a:schemeClr val="tx1"/>
+          </a:fontRef>
+        </p:style>
+      </p:cxnSp>
+      <p:cxnSp>
+        <p:nvCxnSpPr>
+          <p:cNvPr id="71" name="Straight Connector 70"/>
+          <p:cNvCxnSpPr>
+            <a:cxnSpLocks/>
+          </p:cNvCxnSpPr>
+          <p:nvPr/>
+        </p:nvCxnSpPr>
+        <p:spPr>
+          <a:xfrm flipV="1">
+            <a:off x="3006552" y="6466977"/>
+            <a:ext cx="9817200" cy="12031"/>
+          </a:xfrm>
+          <a:prstGeom prst="line">
+            <a:avLst/>
+          </a:prstGeom>
+          <a:ln>
+            <a:solidFill>
+              <a:schemeClr val="bg2"/>
+            </a:solidFill>
+          </a:ln>
+        </p:spPr>
+        <p:style>
+          <a:lnRef idx="1">
+            <a:schemeClr val="accent1"/>
+          </a:lnRef>
+          <a:fillRef idx="0">
+            <a:schemeClr val="accent1"/>
+          </a:fillRef>
+          <a:effectRef idx="0">
+            <a:schemeClr val="accent1"/>
+          </a:effectRef>
+          <a:fontRef idx="minor">
+            <a:schemeClr val="tx1"/>
+          </a:fontRef>
+        </p:style>
+      </p:cxnSp>
+      <p:cxnSp>
+        <p:nvCxnSpPr>
+          <p:cNvPr id="72" name="Straight Connector 71"/>
+          <p:cNvCxnSpPr>
+            <a:cxnSpLocks/>
+          </p:cNvCxnSpPr>
+          <p:nvPr/>
+        </p:nvCxnSpPr>
+        <p:spPr>
+          <a:xfrm flipV="1">
+            <a:off x="3003644" y="6708110"/>
+            <a:ext cx="9817200" cy="12031"/>
+          </a:xfrm>
+          <a:prstGeom prst="line">
+            <a:avLst/>
+          </a:prstGeom>
+          <a:ln>
+            <a:solidFill>
+              <a:schemeClr val="bg2"/>
+            </a:solidFill>
+          </a:ln>
+        </p:spPr>
+        <p:style>
+          <a:lnRef idx="1">
+            <a:schemeClr val="accent1"/>
+          </a:lnRef>
+          <a:fillRef idx="0">
+            <a:schemeClr val="accent1"/>
+          </a:fillRef>
+          <a:effectRef idx="0">
+            <a:schemeClr val="accent1"/>
+          </a:effectRef>
+          <a:fontRef idx="minor">
+            <a:schemeClr val="tx1"/>
+          </a:fontRef>
+        </p:style>
+      </p:cxnSp>
+      <p:cxnSp>
+        <p:nvCxnSpPr>
+          <p:cNvPr id="73" name="Straight Connector 72"/>
+          <p:cNvCxnSpPr>
+            <a:cxnSpLocks/>
+          </p:cNvCxnSpPr>
+          <p:nvPr/>
+        </p:nvCxnSpPr>
+        <p:spPr>
+          <a:xfrm flipV="1">
+            <a:off x="3006552" y="6949243"/>
+            <a:ext cx="9817200" cy="12031"/>
+          </a:xfrm>
+          <a:prstGeom prst="line">
+            <a:avLst/>
+          </a:prstGeom>
+          <a:ln>
+            <a:solidFill>
+              <a:schemeClr val="bg2"/>
+            </a:solidFill>
+          </a:ln>
+        </p:spPr>
+        <p:style>
+          <a:lnRef idx="1">
+            <a:schemeClr val="accent1"/>
+          </a:lnRef>
+          <a:fillRef idx="0">
+            <a:schemeClr val="accent1"/>
+          </a:fillRef>
+          <a:effectRef idx="0">
+            <a:schemeClr val="accent1"/>
+          </a:effectRef>
+          <a:fontRef idx="minor">
+            <a:schemeClr val="tx1"/>
+          </a:fontRef>
+        </p:style>
+      </p:cxnSp>
+      <p:cxnSp>
+        <p:nvCxnSpPr>
+          <p:cNvPr id="74" name="Straight Connector 73"/>
+          <p:cNvCxnSpPr>
+            <a:cxnSpLocks/>
+          </p:cNvCxnSpPr>
+          <p:nvPr/>
+        </p:nvCxnSpPr>
+        <p:spPr>
+          <a:xfrm flipV="1">
+            <a:off x="2989393" y="7190376"/>
+            <a:ext cx="9817200" cy="12031"/>
+          </a:xfrm>
+          <a:prstGeom prst="line">
+            <a:avLst/>
+          </a:prstGeom>
+          <a:ln>
+            <a:solidFill>
+              <a:schemeClr val="bg2"/>
+            </a:solidFill>
+          </a:ln>
+        </p:spPr>
+        <p:style>
+          <a:lnRef idx="1">
+            <a:schemeClr val="accent1"/>
+          </a:lnRef>
+          <a:fillRef idx="0">
+            <a:schemeClr val="accent1"/>
+          </a:fillRef>
+          <a:effectRef idx="0">
+            <a:schemeClr val="accent1"/>
+          </a:effectRef>
+          <a:fontRef idx="minor">
+            <a:schemeClr val="tx1"/>
+          </a:fontRef>
+        </p:style>
+      </p:cxnSp>
+      <p:cxnSp>
+        <p:nvCxnSpPr>
+          <p:cNvPr id="75" name="Straight Connector 74"/>
+          <p:cNvCxnSpPr>
+            <a:cxnSpLocks/>
+          </p:cNvCxnSpPr>
+          <p:nvPr/>
+        </p:nvCxnSpPr>
+        <p:spPr>
+          <a:xfrm flipV="1">
+            <a:off x="2992301" y="7431509"/>
+            <a:ext cx="9817200" cy="12031"/>
+          </a:xfrm>
+          <a:prstGeom prst="line">
+            <a:avLst/>
+          </a:prstGeom>
+          <a:ln>
+            <a:solidFill>
+              <a:schemeClr val="bg2"/>
+            </a:solidFill>
+          </a:ln>
+        </p:spPr>
+        <p:style>
+          <a:lnRef idx="1">
+            <a:schemeClr val="accent1"/>
+          </a:lnRef>
+          <a:fillRef idx="0">
+            <a:schemeClr val="accent1"/>
+          </a:fillRef>
+          <a:effectRef idx="0">
+            <a:schemeClr val="accent1"/>
+          </a:effectRef>
+          <a:fontRef idx="minor">
+            <a:schemeClr val="tx1"/>
+          </a:fontRef>
+        </p:style>
+      </p:cxnSp>
+      <p:cxnSp>
+        <p:nvCxnSpPr>
+          <p:cNvPr id="76" name="Straight Connector 75"/>
+          <p:cNvCxnSpPr>
+            <a:cxnSpLocks/>
+          </p:cNvCxnSpPr>
+          <p:nvPr/>
+        </p:nvCxnSpPr>
+        <p:spPr>
+          <a:xfrm flipV="1">
+            <a:off x="2989393" y="7672642"/>
+            <a:ext cx="9817200" cy="12031"/>
+          </a:xfrm>
+          <a:prstGeom prst="line">
+            <a:avLst/>
+          </a:prstGeom>
+          <a:ln>
+            <a:solidFill>
+              <a:schemeClr val="bg2"/>
+            </a:solidFill>
+          </a:ln>
+        </p:spPr>
+        <p:style>
+          <a:lnRef idx="1">
+            <a:schemeClr val="accent1"/>
+          </a:lnRef>
+          <a:fillRef idx="0">
+            <a:schemeClr val="accent1"/>
+          </a:fillRef>
+          <a:effectRef idx="0">
+            <a:schemeClr val="accent1"/>
+          </a:effectRef>
+          <a:fontRef idx="minor">
+            <a:schemeClr val="tx1"/>
+          </a:fontRef>
+        </p:style>
+      </p:cxnSp>
+      <p:cxnSp>
+        <p:nvCxnSpPr>
+          <p:cNvPr id="77" name="Straight Connector 76"/>
+          <p:cNvCxnSpPr>
+            <a:cxnSpLocks/>
+          </p:cNvCxnSpPr>
+          <p:nvPr/>
+        </p:nvCxnSpPr>
+        <p:spPr>
+          <a:xfrm flipV="1">
+            <a:off x="2992301" y="7913775"/>
+            <a:ext cx="9817200" cy="12031"/>
+          </a:xfrm>
+          <a:prstGeom prst="line">
+            <a:avLst/>
+          </a:prstGeom>
+          <a:ln>
+            <a:solidFill>
+              <a:schemeClr val="bg2"/>
+            </a:solidFill>
+          </a:ln>
+        </p:spPr>
+        <p:style>
+          <a:lnRef idx="1">
+            <a:schemeClr val="accent1"/>
+          </a:lnRef>
+          <a:fillRef idx="0">
+            <a:schemeClr val="accent1"/>
+          </a:fillRef>
+          <a:effectRef idx="0">
+            <a:schemeClr val="accent1"/>
+          </a:effectRef>
+          <a:fontRef idx="minor">
+            <a:schemeClr val="tx1"/>
+          </a:fontRef>
+        </p:style>
+      </p:cxnSp>
+      <p:cxnSp>
+        <p:nvCxnSpPr>
+          <p:cNvPr id="78" name="Straight Connector 77"/>
+          <p:cNvCxnSpPr>
+            <a:cxnSpLocks/>
+          </p:cNvCxnSpPr>
+          <p:nvPr/>
+        </p:nvCxnSpPr>
+        <p:spPr>
+          <a:xfrm flipV="1">
+            <a:off x="2989393" y="8154908"/>
+            <a:ext cx="9817200" cy="12031"/>
+          </a:xfrm>
+          <a:prstGeom prst="line">
+            <a:avLst/>
+          </a:prstGeom>
+          <a:ln>
+            <a:solidFill>
+              <a:schemeClr val="bg2"/>
+            </a:solidFill>
+          </a:ln>
+        </p:spPr>
+        <p:style>
+          <a:lnRef idx="1">
+            <a:schemeClr val="accent1"/>
+          </a:lnRef>
+          <a:fillRef idx="0">
+            <a:schemeClr val="accent1"/>
+          </a:fillRef>
+          <a:effectRef idx="0">
+            <a:schemeClr val="accent1"/>
+          </a:effectRef>
+          <a:fontRef idx="minor">
+            <a:schemeClr val="tx1"/>
+          </a:fontRef>
+        </p:style>
+      </p:cxnSp>
+      <p:pic>
+        <p:nvPicPr>
+          <p:cNvPr id="89" name="Picture 88"/>
+          <p:cNvPicPr>
+            <a:picLocks noChangeAspect="1"/>
+          </p:cNvPicPr>
+          <p:nvPr/>
+        </p:nvPicPr>
+        <p:blipFill>
+          <a:blip r:embed="rId4"/>
+          <a:stretch>
+            <a:fillRect/>
+          </a:stretch>
+        </p:blipFill>
+        <p:spPr>
+          <a:xfrm>
+            <a:off x="1739900" y="9163228"/>
+            <a:ext cx="1117600" cy="393700"/>
+          </a:xfrm>
+          <a:prstGeom prst="rect">
+            <a:avLst/>
+          </a:prstGeom>
+        </p:spPr>
+      </p:pic>
+      <p:cxnSp>
+        <p:nvCxnSpPr>
+          <p:cNvPr id="91" name="Straight Connector 90"/>
+          <p:cNvCxnSpPr/>
+          <p:nvPr/>
+        </p:nvCxnSpPr>
+        <p:spPr>
+          <a:xfrm flipH="1">
+            <a:off x="7886700" y="1864526"/>
+            <a:ext cx="5622" cy="6543546"/>
+          </a:xfrm>
+          <a:prstGeom prst="line">
+            <a:avLst/>
+          </a:prstGeom>
+          <a:ln w="127000">
+            <a:solidFill>
+              <a:schemeClr val="tx1">
+                <a:alpha val="10000"/>
+              </a:schemeClr>
+            </a:solidFill>
+            <a:prstDash val="lgDash"/>
+          </a:ln>
+          <a:effectLst>
+            <a:outerShdw blurRad="50800" dist="38100" dir="2700000" algn="tl" rotWithShape="0">
+              <a:prstClr val="black">
+                <a:alpha val="40000"/>
+              </a:prstClr>
+            </a:outerShdw>
+          </a:effectLst>
+        </p:spPr>
+        <p:style>
+          <a:lnRef idx="1">
+            <a:schemeClr val="accent1"/>
+          </a:lnRef>
+          <a:fillRef idx="0">
+            <a:schemeClr val="accent1"/>
+          </a:fillRef>
+          <a:effectRef idx="0">
+            <a:schemeClr val="accent1"/>
+          </a:effectRef>
+          <a:fontRef idx="minor">
+            <a:schemeClr val="tx1"/>
+          </a:fontRef>
+        </p:style>
+      </p:cxnSp>
+      <p:sp>
+        <p:nvSpPr>
+          <p:cNvPr id="4" name="Rectangle 3"/>
+          <p:cNvSpPr/>
+          <p:nvPr/>
+        </p:nvSpPr>
+        <p:spPr>
+          <a:xfrm>
+            <a:off x="0" y="0"/>
+            <a:ext cx="12801600" cy="9601200"/>
+          </a:xfrm>
+          <a:prstGeom prst="rect">
+            <a:avLst/>
+          </a:prstGeom>
+          <a:noFill/>
+          <a:ln>
+            <a:solidFill>
+              <a:schemeClr val="tx1"/>
+            </a:solidFill>
+          </a:ln>
+        </p:spPr>
+        <p:style>
+          <a:lnRef idx="2">
+            <a:schemeClr val="accent1">
+              <a:shade val="50000"/>
+            </a:schemeClr>
+          </a:lnRef>
+          <a:fillRef idx="1">
+            <a:schemeClr val="accent1"/>
+          </a:fillRef>
+          <a:effectRef idx="0">
+            <a:schemeClr val="accent1"/>
+          </a:effectRef>
+          <a:fontRef idx="minor">
+            <a:schemeClr val="lt1"/>
+          </a:fontRef>
+        </p:style>
+        <p:txBody>
+          <a:bodyPr rtlCol="0" anchor="ctr"/>
+          <a:lstStyle/>
+          <a:p>
+            <a:pPr algn="ctr"/>
+            <a:endParaRPr lang="en-US">
+              <a:solidFill>
+                <a:schemeClr val="tx1"/>
+              </a:solidFill>
+              <a:latin typeface="Century Gothic" charset="0"/>
+              <a:ea typeface="Century Gothic" charset="0"/>
+              <a:cs typeface="Century Gothic" charset="0"/>
+            </a:endParaRPr>
+          </a:p>
+        </p:txBody>
+      </p:sp>
+      <p:sp>
+        <p:nvSpPr>
+          <p:cNvPr id="2" name="TextBox 1"/>
+          <p:cNvSpPr txBox="1"/>
+          <p:nvPr/>
+        </p:nvSpPr>
+        <p:spPr>
+          <a:xfrm>
+            <a:off x="7480315" y="52460"/>
+            <a:ext cx="256802" cy="261610"/>
+          </a:xfrm>
+          <a:prstGeom prst="rect">
+            <a:avLst/>
+          </a:prstGeom>
+          <a:noFill/>
+        </p:spPr>
+        <p:txBody>
+          <a:bodyPr wrap="none" rtlCol="0">
+            <a:spAutoFit/>
+          </a:bodyPr>
+          <a:lstStyle/>
+          <a:p>
+            <a:r>
+              <a:rPr lang="en-US" sz="1100" dirty="0" smtClean="0">
+                <a:solidFill>
+                  <a:schemeClr val="bg1">
+                    <a:lumMod val="50000"/>
+                  </a:schemeClr>
+                </a:solidFill>
+              </a:rPr>
+              <a:t>1</a:t>
+            </a:r>
+            <a:endParaRPr lang="en-US" sz="1100" dirty="0">
+              <a:solidFill>
+                <a:schemeClr val="bg1">
+                  <a:lumMod val="50000"/>
+                </a:schemeClr>
+              </a:solidFill>
+            </a:endParaRPr>
+          </a:p>
+        </p:txBody>
+      </p:sp>
+      <p:sp>
+        <p:nvSpPr>
+          <p:cNvPr id="50" name="TextBox 49"/>
+          <p:cNvSpPr txBox="1"/>
+          <p:nvPr/>
+        </p:nvSpPr>
+        <p:spPr>
+          <a:xfrm>
+            <a:off x="10149212" y="52164"/>
+            <a:ext cx="256802" cy="261610"/>
+          </a:xfrm>
+          <a:prstGeom prst="rect">
+            <a:avLst/>
+          </a:prstGeom>
+          <a:noFill/>
+        </p:spPr>
+        <p:txBody>
+          <a:bodyPr wrap="none" rtlCol="0">
+            <a:spAutoFit/>
+          </a:bodyPr>
+          <a:lstStyle/>
+          <a:p>
+            <a:r>
+              <a:rPr lang="en-US" sz="1100" dirty="0" smtClean="0">
+                <a:solidFill>
+                  <a:schemeClr val="bg1">
+                    <a:lumMod val="50000"/>
+                  </a:schemeClr>
+                </a:solidFill>
+              </a:rPr>
+              <a:t>2</a:t>
+            </a:r>
+            <a:endParaRPr lang="en-US" sz="1100" dirty="0">
+              <a:solidFill>
+                <a:schemeClr val="bg1">
+                  <a:lumMod val="50000"/>
+                </a:schemeClr>
+              </a:solidFill>
+            </a:endParaRPr>
+          </a:p>
+        </p:txBody>
+      </p:sp>
+      <p:sp>
+        <p:nvSpPr>
+          <p:cNvPr id="82" name="TextBox 81"/>
+          <p:cNvSpPr txBox="1"/>
+          <p:nvPr/>
+        </p:nvSpPr>
+        <p:spPr>
+          <a:xfrm>
+            <a:off x="3003644" y="1407405"/>
+            <a:ext cx="256802" cy="261610"/>
+          </a:xfrm>
+          <a:prstGeom prst="rect">
+            <a:avLst/>
+          </a:prstGeom>
+          <a:noFill/>
+        </p:spPr>
+        <p:txBody>
+          <a:bodyPr wrap="none" rtlCol="0">
+            <a:spAutoFit/>
+          </a:bodyPr>
+          <a:lstStyle/>
+          <a:p>
+            <a:r>
+              <a:rPr lang="en-US" sz="1100" dirty="0" smtClean="0">
+                <a:solidFill>
+                  <a:schemeClr val="bg1">
+                    <a:lumMod val="50000"/>
+                  </a:schemeClr>
+                </a:solidFill>
+              </a:rPr>
+              <a:t>3</a:t>
+            </a:r>
+            <a:endParaRPr lang="en-US" sz="1100" dirty="0">
+              <a:solidFill>
+                <a:schemeClr val="bg1">
+                  <a:lumMod val="50000"/>
+                </a:schemeClr>
+              </a:solidFill>
+            </a:endParaRPr>
+          </a:p>
+        </p:txBody>
+      </p:sp>
+      <p:sp>
+        <p:nvSpPr>
+          <p:cNvPr id="83" name="TextBox 82"/>
+          <p:cNvSpPr txBox="1"/>
+          <p:nvPr/>
+        </p:nvSpPr>
+        <p:spPr>
+          <a:xfrm>
+            <a:off x="2965544" y="3324791"/>
+            <a:ext cx="349156" cy="430887"/>
+          </a:xfrm>
+          <a:prstGeom prst="rect">
+            <a:avLst/>
+          </a:prstGeom>
+          <a:noFill/>
+        </p:spPr>
+        <p:txBody>
+          <a:bodyPr wrap="square" rtlCol="0">
+            <a:spAutoFit/>
+          </a:bodyPr>
+          <a:lstStyle/>
+          <a:p>
+            <a:pPr algn="ctr"/>
+            <a:r>
+              <a:rPr lang="en-US" sz="1100" smtClean="0">
+                <a:solidFill>
+                  <a:schemeClr val="bg1">
+                    <a:lumMod val="50000"/>
+                  </a:schemeClr>
+                </a:solidFill>
+              </a:rPr>
+              <a:t>4 ↓</a:t>
+            </a:r>
+            <a:endParaRPr lang="en-US" sz="1100" dirty="0">
+              <a:solidFill>
+                <a:schemeClr val="bg1">
+                  <a:lumMod val="50000"/>
+                </a:schemeClr>
+              </a:solidFill>
+            </a:endParaRPr>
+          </a:p>
+        </p:txBody>
+      </p:sp>
+    </p:spTree>
+    <p:extLst>
+      <p:ext uri="{BB962C8B-B14F-4D97-AF65-F5344CB8AC3E}">
+        <p14:creationId xmlns:p14="http://schemas.microsoft.com/office/powerpoint/2010/main" val="1714636915"/>
+      </p:ext>
+    </p:extLst>
+  </p:cSld>
+  <p:clrMapOvr>
+    <a:masterClrMapping/>
+  </p:clrMapOvr>
+  <p:timing>
+    <p:tnLst>
+      <p:par>
+        <p:cTn id="1" dur="indefinite" restart="never" nodeType="tmRoot"/>
+      </p:par>
+    </p:tnLst>
+  </p:timing>
 </p:sld>
 </file>
 

</xml_diff>